<commit_message>
updated slides for clarity and for inclusion of missing nibble
</commit_message>
<xml_diff>
--- a/format-encodings/slide_presentations/.hidden/checksum.pptx
+++ b/format-encodings/slide_presentations/.hidden/checksum.pptx
@@ -8052,8 +8052,8 @@
         </p:nvSpPr>
         <p:spPr>
           <a:xfrm>
-            <a:off x="311699" y="1152475"/>
-            <a:ext cx="5767367" cy="3250192"/>
+            <a:off x="311699" y="1609671"/>
+            <a:ext cx="8520600" cy="3250192"/>
           </a:xfrm>
         </p:spPr>
         <p:txBody>
@@ -8063,15 +8063,15 @@
           <a:lstStyle/>
           <a:p>
             <a:r>
-              <a:rPr lang="en-US" sz="1000" spc="300" dirty="0">
+              <a:rPr lang="en-US" sz="1100" spc="300" dirty="0">
                 <a:latin typeface="Source Code Pro" panose="020B0509030403020204" pitchFamily="49" charset="0"/>
                 <a:ea typeface="Source Code Pro" panose="020B0509030403020204" pitchFamily="49" charset="0"/>
                 <a:cs typeface="Courier New" panose="02070309020205020404" pitchFamily="49" charset="0"/>
               </a:rPr>
-              <a:t>1010 1101 1110 </a:t>
+              <a:t>1010 1001 1101 1110 </a:t>
             </a:r>
             <a:r>
-              <a:rPr lang="en-US" sz="1000" spc="300" dirty="0">
+              <a:rPr lang="en-US" sz="1100" spc="300" dirty="0">
                 <a:latin typeface="Source Code Pro" panose="020B0509030403020204" pitchFamily="49" charset="0"/>
                 <a:ea typeface="Source Code Pro" panose="020B0509030403020204" pitchFamily="49" charset="0"/>
                 <a:cs typeface="Courier New" panose="02070309020205020404" pitchFamily="49" charset="0"/>
@@ -8080,25 +8080,38 @@
               <a:t></a:t>
             </a:r>
             <a:r>
-              <a:rPr lang="en-US" sz="1000" spc="300" dirty="0">
+              <a:rPr lang="en-US" sz="1100" spc="300" dirty="0">
                 <a:latin typeface="Source Code Pro" panose="020B0509030403020204" pitchFamily="49" charset="0"/>
                 <a:ea typeface="Source Code Pro" panose="020B0509030403020204" pitchFamily="49" charset="0"/>
                 <a:cs typeface="Courier New" panose="02070309020205020404" pitchFamily="49" charset="0"/>
               </a:rPr>
-              <a:t> 43486</a:t>
+              <a:t> 43486                     </a:t>
             </a:r>
-          </a:p>
-          <a:p>
             <a:r>
-              <a:rPr lang="en-US" sz="1000" spc="300" dirty="0">
+              <a:rPr lang="en-US" sz="1100" spc="300" dirty="0">
+                <a:latin typeface="Source Code Pro" panose="020B0509030403020204" pitchFamily="49" charset="0"/>
+                <a:ea typeface="Source Code Pro" panose="020B0509030403020204" pitchFamily="49" charset="0"/>
+                <a:sym typeface="Wingdings" pitchFamily="2" charset="2"/>
+              </a:rPr>
+              <a:t>2^16 = 65,536</a:t>
+            </a:r>
+            <a:endParaRPr lang="en-US" sz="1100" spc="300" dirty="0">
+              <a:latin typeface="Source Code Pro" panose="020B0509030403020204" pitchFamily="49" charset="0"/>
+              <a:ea typeface="Source Code Pro" panose="020B0509030403020204" pitchFamily="49" charset="0"/>
+              <a:cs typeface="Courier New" panose="02070309020205020404" pitchFamily="49" charset="0"/>
+            </a:endParaRPr>
+          </a:p>
+          <a:p>
+            <a:r>
+              <a:rPr lang="en-US" sz="1100" spc="300" dirty="0">
                 <a:latin typeface="Source Code Pro" panose="020B0509030403020204" pitchFamily="49" charset="0"/>
                 <a:ea typeface="Source Code Pro" panose="020B0509030403020204" pitchFamily="49" charset="0"/>
                 <a:cs typeface="Courier New" panose="02070309020205020404" pitchFamily="49" charset="0"/>
               </a:rPr>
-              <a:t>0000 1010 0000 </a:t>
+              <a:t>0000 1001 1010 0000 </a:t>
             </a:r>
             <a:r>
-              <a:rPr lang="en-US" sz="1000" spc="300" dirty="0">
+              <a:rPr lang="en-US" sz="1100" spc="300" dirty="0">
                 <a:latin typeface="Source Code Pro" panose="020B0509030403020204" pitchFamily="49" charset="0"/>
                 <a:ea typeface="Source Code Pro" panose="020B0509030403020204" pitchFamily="49" charset="0"/>
                 <a:cs typeface="Courier New" panose="02070309020205020404" pitchFamily="49" charset="0"/>
@@ -8107,25 +8120,46 @@
               <a:t></a:t>
             </a:r>
             <a:r>
-              <a:rPr lang="en-US" sz="1000" spc="300" dirty="0">
+              <a:rPr lang="en-US" sz="1100" spc="300" dirty="0">
                 <a:latin typeface="Source Code Pro" panose="020B0509030403020204" pitchFamily="49" charset="0"/>
                 <a:ea typeface="Source Code Pro" panose="020B0509030403020204" pitchFamily="49" charset="0"/>
                 <a:cs typeface="Courier New" panose="02070309020205020404" pitchFamily="49" charset="0"/>
               </a:rPr>
-              <a:t>  2464</a:t>
+              <a:t>  2464                  </a:t>
             </a:r>
-          </a:p>
-          <a:p>
             <a:r>
-              <a:rPr lang="en-US" sz="1000" spc="300" dirty="0">
+              <a:rPr lang="en-US" sz="1100" spc="300" dirty="0" err="1">
+                <a:latin typeface="Source Code Pro" panose="020B0509030403020204" pitchFamily="49" charset="0"/>
+                <a:ea typeface="Source Code Pro" panose="020B0509030403020204" pitchFamily="49" charset="0"/>
+                <a:sym typeface="Wingdings" pitchFamily="2" charset="2"/>
+              </a:rPr>
+              <a:t>max_int</a:t>
+            </a:r>
+            <a:r>
+              <a:rPr lang="en-US" sz="1100" spc="300" dirty="0">
+                <a:latin typeface="Source Code Pro" panose="020B0509030403020204" pitchFamily="49" charset="0"/>
+                <a:ea typeface="Source Code Pro" panose="020B0509030403020204" pitchFamily="49" charset="0"/>
+                <a:sym typeface="Wingdings" pitchFamily="2" charset="2"/>
+              </a:rPr>
+              <a:t> = 65,535</a:t>
+            </a:r>
+            <a:endParaRPr lang="en-US" sz="1100" spc="300" dirty="0">
+              <a:latin typeface="Source Code Pro" panose="020B0509030403020204" pitchFamily="49" charset="0"/>
+              <a:ea typeface="Source Code Pro" panose="020B0509030403020204" pitchFamily="49" charset="0"/>
+              <a:cs typeface="Courier New" panose="02070309020205020404" pitchFamily="49" charset="0"/>
+            </a:endParaRPr>
+          </a:p>
+          <a:p>
+            <a:r>
+              <a:rPr lang="en-US" sz="1100" spc="300" dirty="0">
                 <a:latin typeface="Source Code Pro" panose="020B0509030403020204" pitchFamily="49" charset="0"/>
                 <a:ea typeface="Source Code Pro" panose="020B0509030403020204" pitchFamily="49" charset="0"/>
                 <a:cs typeface="Courier New" panose="02070309020205020404" pitchFamily="49" charset="0"/>
               </a:rPr>
-              <a:t>1110 0001 1000 </a:t>
+              <a:t>1110 1101 0001 1000 </a:t>
             </a:r>
             <a:r>
-              <a:rPr lang="en-US" sz="1000" spc="300" dirty="0">
+              <a:rPr lang="en-US" sz="1100" spc="300" dirty="0">
                 <a:latin typeface="Source Code Pro" panose="020B0509030403020204" pitchFamily="49" charset="0"/>
                 <a:ea typeface="Source Code Pro" panose="020B0509030403020204" pitchFamily="49" charset="0"/>
                 <a:cs typeface="Courier New" panose="02070309020205020404" pitchFamily="49" charset="0"/>
@@ -8134,7 +8168,7 @@
               <a:t></a:t>
             </a:r>
             <a:r>
-              <a:rPr lang="en-US" sz="1000" spc="300" dirty="0">
+              <a:rPr lang="en-US" sz="1100" spc="300" dirty="0">
                 <a:latin typeface="Source Code Pro" panose="020B0509030403020204" pitchFamily="49" charset="0"/>
                 <a:ea typeface="Source Code Pro" panose="020B0509030403020204" pitchFamily="49" charset="0"/>
                 <a:cs typeface="Courier New" panose="02070309020205020404" pitchFamily="49" charset="0"/>
@@ -8144,15 +8178,15 @@
           </a:p>
           <a:p>
             <a:r>
-              <a:rPr lang="en-US" sz="1000" spc="300" dirty="0">
+              <a:rPr lang="en-US" sz="1100" spc="300" dirty="0">
                 <a:latin typeface="Source Code Pro" panose="020B0509030403020204" pitchFamily="49" charset="0"/>
                 <a:ea typeface="Source Code Pro" panose="020B0509030403020204" pitchFamily="49" charset="0"/>
                 <a:cs typeface="Courier New" panose="02070309020205020404" pitchFamily="49" charset="0"/>
               </a:rPr>
-              <a:t>1010 0010 0101 </a:t>
+              <a:t>1010 0011 0010 0101 </a:t>
             </a:r>
             <a:r>
-              <a:rPr lang="en-US" sz="1000" spc="300" dirty="0">
+              <a:rPr lang="en-US" sz="1100" spc="300" dirty="0">
                 <a:latin typeface="Source Code Pro" panose="020B0509030403020204" pitchFamily="49" charset="0"/>
                 <a:ea typeface="Source Code Pro" panose="020B0509030403020204" pitchFamily="49" charset="0"/>
                 <a:cs typeface="Courier New" panose="02070309020205020404" pitchFamily="49" charset="0"/>
@@ -8161,7 +8195,7 @@
               <a:t></a:t>
             </a:r>
             <a:r>
-              <a:rPr lang="en-US" sz="1000" spc="300" dirty="0">
+              <a:rPr lang="en-US" sz="1100" spc="300" dirty="0">
                 <a:latin typeface="Source Code Pro" panose="020B0509030403020204" pitchFamily="49" charset="0"/>
                 <a:ea typeface="Source Code Pro" panose="020B0509030403020204" pitchFamily="49" charset="0"/>
                 <a:cs typeface="Courier New" panose="02070309020205020404" pitchFamily="49" charset="0"/>
@@ -8171,15 +8205,15 @@
           </a:p>
           <a:p>
             <a:r>
-              <a:rPr lang="en-US" sz="1000" spc="300" dirty="0">
+              <a:rPr lang="en-US" sz="1100" spc="300" dirty="0">
                 <a:latin typeface="Source Code Pro" panose="020B0509030403020204" pitchFamily="49" charset="0"/>
                 <a:ea typeface="Source Code Pro" panose="020B0509030403020204" pitchFamily="49" charset="0"/>
                 <a:cs typeface="Courier New" panose="02070309020205020404" pitchFamily="49" charset="0"/>
               </a:rPr>
-              <a:t>1010 1101 1110 </a:t>
+              <a:t>1010 1001 1101 1110 </a:t>
             </a:r>
             <a:r>
-              <a:rPr lang="en-US" sz="1000" spc="300" dirty="0">
+              <a:rPr lang="en-US" sz="1100" spc="300" dirty="0">
                 <a:latin typeface="Source Code Pro" panose="020B0509030403020204" pitchFamily="49" charset="0"/>
                 <a:ea typeface="Source Code Pro" panose="020B0509030403020204" pitchFamily="49" charset="0"/>
                 <a:cs typeface="Courier New" panose="02070309020205020404" pitchFamily="49" charset="0"/>
@@ -8188,7 +8222,7 @@
               <a:t> </a:t>
             </a:r>
             <a:r>
-              <a:rPr lang="en-US" sz="1000" spc="300" dirty="0">
+              <a:rPr lang="en-US" sz="1100" spc="300" dirty="0">
                 <a:latin typeface="Source Code Pro" panose="020B0509030403020204" pitchFamily="49" charset="0"/>
                 <a:ea typeface="Source Code Pro" panose="020B0509030403020204" pitchFamily="49" charset="0"/>
                 <a:cs typeface="Courier New" panose="02070309020205020404" pitchFamily="49" charset="0"/>
@@ -8198,7 +8232,7 @@
           </a:p>
           <a:p>
             <a:r>
-              <a:rPr lang="en-US" sz="1000" spc="300" dirty="0">
+              <a:rPr lang="en-US" sz="1100" spc="300" dirty="0">
                 <a:highlight>
                   <a:srgbClr val="FFFF00"/>
                 </a:highlight>
@@ -8206,10 +8240,10 @@
                 <a:ea typeface="Source Code Pro" panose="020B0509030403020204" pitchFamily="49" charset="0"/>
                 <a:cs typeface="Courier New" panose="02070309020205020404" pitchFamily="49" charset="0"/>
               </a:rPr>
-              <a:t>1000 0110 1100</a:t>
+              <a:t>1000 1011 0110 1100</a:t>
             </a:r>
             <a:r>
-              <a:rPr lang="en-US" sz="1000" spc="300" dirty="0">
+              <a:rPr lang="en-US" sz="1100" spc="300" dirty="0">
                 <a:latin typeface="Source Code Pro" panose="020B0509030403020204" pitchFamily="49" charset="0"/>
                 <a:ea typeface="Source Code Pro" panose="020B0509030403020204" pitchFamily="49" charset="0"/>
                 <a:cs typeface="Courier New" panose="02070309020205020404" pitchFamily="49" charset="0"/>
@@ -8217,7 +8251,7 @@
               <a:t> </a:t>
             </a:r>
             <a:r>
-              <a:rPr lang="en-US" sz="1000" spc="300" dirty="0">
+              <a:rPr lang="en-US" sz="1100" spc="300" dirty="0">
                 <a:latin typeface="Source Code Pro" panose="020B0509030403020204" pitchFamily="49" charset="0"/>
                 <a:ea typeface="Source Code Pro" panose="020B0509030403020204" pitchFamily="49" charset="0"/>
                 <a:cs typeface="Courier New" panose="02070309020205020404" pitchFamily="49" charset="0"/>
@@ -8226,7 +8260,7 @@
               <a:t></a:t>
             </a:r>
             <a:r>
-              <a:rPr lang="en-US" sz="1000" spc="300" dirty="0">
+              <a:rPr lang="en-US" sz="1100" spc="300" dirty="0">
                 <a:latin typeface="Source Code Pro" panose="020B0509030403020204" pitchFamily="49" charset="0"/>
                 <a:ea typeface="Source Code Pro" panose="020B0509030403020204" pitchFamily="49" charset="0"/>
                 <a:cs typeface="Courier New" panose="02070309020205020404" pitchFamily="49" charset="0"/>
@@ -8234,7 +8268,7 @@
               <a:t>     0 </a:t>
             </a:r>
             <a:r>
-              <a:rPr lang="en-US" sz="1000" strike="sngStrike" spc="300" dirty="0">
+              <a:rPr lang="en-US" sz="1100" strike="sngStrike" spc="300" dirty="0">
                 <a:latin typeface="Source Code Pro" panose="020B0509030403020204" pitchFamily="49" charset="0"/>
                 <a:ea typeface="Source Code Pro" panose="020B0509030403020204" pitchFamily="49" charset="0"/>
                 <a:cs typeface="Courier New" panose="02070309020205020404" pitchFamily="49" charset="0"/>
@@ -8244,15 +8278,15 @@
           </a:p>
           <a:p>
             <a:r>
-              <a:rPr lang="en-US" sz="1000" spc="300" dirty="0">
+              <a:rPr lang="en-US" sz="1100" spc="300" dirty="0">
                 <a:latin typeface="Source Code Pro" panose="020B0509030403020204" pitchFamily="49" charset="0"/>
                 <a:ea typeface="Source Code Pro" panose="020B0509030403020204" pitchFamily="49" charset="0"/>
                 <a:cs typeface="Courier New" panose="02070309020205020404" pitchFamily="49" charset="0"/>
               </a:rPr>
-              <a:t>1110 0001 1000 </a:t>
+              <a:t>1110 1101 0001 1000 </a:t>
             </a:r>
             <a:r>
-              <a:rPr lang="en-US" sz="1000" spc="300" dirty="0">
+              <a:rPr lang="en-US" sz="1100" spc="300" dirty="0">
                 <a:latin typeface="Source Code Pro" panose="020B0509030403020204" pitchFamily="49" charset="0"/>
                 <a:ea typeface="Source Code Pro" panose="020B0509030403020204" pitchFamily="49" charset="0"/>
                 <a:cs typeface="Courier New" panose="02070309020205020404" pitchFamily="49" charset="0"/>
@@ -8261,7 +8295,7 @@
               <a:t></a:t>
             </a:r>
             <a:r>
-              <a:rPr lang="en-US" sz="1000" spc="300" dirty="0">
+              <a:rPr lang="en-US" sz="1100" spc="300" dirty="0">
                 <a:latin typeface="Source Code Pro" panose="020B0509030403020204" pitchFamily="49" charset="0"/>
                 <a:ea typeface="Source Code Pro" panose="020B0509030403020204" pitchFamily="49" charset="0"/>
                 <a:cs typeface="Courier New" panose="02070309020205020404" pitchFamily="49" charset="0"/>
@@ -8271,15 +8305,15 @@
           </a:p>
           <a:p>
             <a:r>
-              <a:rPr lang="en-US" sz="1000" spc="300" dirty="0">
+              <a:rPr lang="en-US" sz="1100" spc="300" dirty="0">
                 <a:latin typeface="Source Code Pro" panose="020B0509030403020204" pitchFamily="49" charset="0"/>
                 <a:ea typeface="Source Code Pro" panose="020B0509030403020204" pitchFamily="49" charset="0"/>
                 <a:cs typeface="Courier New" panose="02070309020205020404" pitchFamily="49" charset="0"/>
               </a:rPr>
-              <a:t>1010 0010 0101 </a:t>
+              <a:t>1010 0011 0010 0101 </a:t>
             </a:r>
             <a:r>
-              <a:rPr lang="en-US" sz="1000" spc="300" dirty="0">
+              <a:rPr lang="en-US" sz="1100" spc="300" dirty="0">
                 <a:latin typeface="Source Code Pro" panose="020B0509030403020204" pitchFamily="49" charset="0"/>
                 <a:ea typeface="Source Code Pro" panose="020B0509030403020204" pitchFamily="49" charset="0"/>
                 <a:cs typeface="Courier New" panose="02070309020205020404" pitchFamily="49" charset="0"/>
@@ -8288,7 +8322,7 @@
               <a:t></a:t>
             </a:r>
             <a:r>
-              <a:rPr lang="en-US" sz="1000" spc="300" dirty="0">
+              <a:rPr lang="en-US" sz="1100" spc="300" dirty="0">
                 <a:latin typeface="Source Code Pro" panose="020B0509030403020204" pitchFamily="49" charset="0"/>
                 <a:ea typeface="Source Code Pro" panose="020B0509030403020204" pitchFamily="49" charset="0"/>
                 <a:cs typeface="Courier New" panose="02070309020205020404" pitchFamily="49" charset="0"/>
@@ -8298,15 +8332,15 @@
           </a:p>
           <a:p>
             <a:r>
-              <a:rPr lang="en-US" sz="1000" spc="300" dirty="0">
+              <a:rPr lang="en-US" sz="1100" spc="300" dirty="0">
                 <a:latin typeface="Source Code Pro" panose="020B0509030403020204" pitchFamily="49" charset="0"/>
                 <a:ea typeface="Source Code Pro" panose="020B0509030403020204" pitchFamily="49" charset="0"/>
                 <a:cs typeface="Courier New" panose="02070309020205020404" pitchFamily="49" charset="0"/>
               </a:rPr>
-              <a:t>0000 1010 0000 </a:t>
+              <a:t>0000 1001 1010 0000 </a:t>
             </a:r>
             <a:r>
-              <a:rPr lang="en-US" sz="1000" spc="300" dirty="0">
+              <a:rPr lang="en-US" sz="1100" spc="300" dirty="0">
                 <a:latin typeface="Source Code Pro" panose="020B0509030403020204" pitchFamily="49" charset="0"/>
                 <a:ea typeface="Source Code Pro" panose="020B0509030403020204" pitchFamily="49" charset="0"/>
                 <a:cs typeface="Courier New" panose="02070309020205020404" pitchFamily="49" charset="0"/>
@@ -8315,7 +8349,7 @@
               <a:t></a:t>
             </a:r>
             <a:r>
-              <a:rPr lang="en-US" sz="1000" spc="300" dirty="0">
+              <a:rPr lang="en-US" sz="1100" spc="300" dirty="0">
                 <a:latin typeface="Source Code Pro" panose="020B0509030403020204" pitchFamily="49" charset="0"/>
                 <a:ea typeface="Source Code Pro" panose="020B0509030403020204" pitchFamily="49" charset="0"/>
                 <a:cs typeface="Courier New" panose="02070309020205020404" pitchFamily="49" charset="0"/>
@@ -8325,15 +8359,15 @@
           </a:p>
           <a:p>
             <a:r>
-              <a:rPr lang="en-US" sz="1000" spc="300" dirty="0">
+              <a:rPr lang="en-US" sz="1100" spc="300" dirty="0">
                 <a:latin typeface="Source Code Pro" panose="020B0509030403020204" pitchFamily="49" charset="0"/>
                 <a:ea typeface="Source Code Pro" panose="020B0509030403020204" pitchFamily="49" charset="0"/>
                 <a:cs typeface="Courier New" panose="02070309020205020404" pitchFamily="49" charset="0"/>
               </a:rPr>
-              <a:t>1110 0001 1000 </a:t>
+              <a:t>1110 1101 0001 1000 </a:t>
             </a:r>
             <a:r>
-              <a:rPr lang="en-US" sz="1000" spc="300" dirty="0">
+              <a:rPr lang="en-US" sz="1100" spc="300" dirty="0">
                 <a:latin typeface="Source Code Pro" panose="020B0509030403020204" pitchFamily="49" charset="0"/>
                 <a:ea typeface="Source Code Pro" panose="020B0509030403020204" pitchFamily="49" charset="0"/>
                 <a:cs typeface="Courier New" panose="02070309020205020404" pitchFamily="49" charset="0"/>
@@ -8342,7 +8376,7 @@
               <a:t></a:t>
             </a:r>
             <a:r>
-              <a:rPr lang="en-US" sz="1000" spc="300" dirty="0">
+              <a:rPr lang="en-US" sz="1100" spc="300" dirty="0">
                 <a:latin typeface="Source Code Pro" panose="020B0509030403020204" pitchFamily="49" charset="0"/>
                 <a:ea typeface="Source Code Pro" panose="020B0509030403020204" pitchFamily="49" charset="0"/>
                 <a:cs typeface="Courier New" panose="02070309020205020404" pitchFamily="49" charset="0"/>
@@ -8351,7 +8385,7 @@
             </a:r>
           </a:p>
           <a:p>
-            <a:endParaRPr lang="en-US" sz="1000" spc="300" dirty="0">
+            <a:endParaRPr lang="en-US" sz="1100" spc="300" dirty="0">
               <a:latin typeface="Source Code Pro" panose="020B0509030403020204" pitchFamily="49" charset="0"/>
               <a:ea typeface="Source Code Pro" panose="020B0509030403020204" pitchFamily="49" charset="0"/>
             </a:endParaRPr>
@@ -8361,18 +8395,18 @@
               <a:buNone/>
             </a:pPr>
             <a:r>
-              <a:rPr lang="en-US" sz="1000" spc="300" dirty="0">
+              <a:rPr lang="en-US" sz="1100" spc="300" dirty="0">
                 <a:latin typeface="Source Code Pro" panose="020B0509030403020204" pitchFamily="49" charset="0"/>
                 <a:ea typeface="Source Code Pro" panose="020B0509030403020204" pitchFamily="49" charset="0"/>
               </a:rPr>
-              <a:t>                   357518</a:t>
+              <a:t>                  sum = 357518</a:t>
             </a:r>
           </a:p>
           <a:p>
             <a:pPr marL="139700" indent="0">
               <a:buNone/>
             </a:pPr>
-            <a:endParaRPr lang="en-US" sz="1000" spc="300" dirty="0">
+            <a:endParaRPr lang="en-US" sz="1100" spc="300" dirty="0">
               <a:latin typeface="Source Code Pro" panose="020B0509030403020204" pitchFamily="49" charset="0"/>
               <a:ea typeface="Source Code Pro" panose="020B0509030403020204" pitchFamily="49" charset="0"/>
             </a:endParaRPr>
@@ -8382,14 +8416,21 @@
               <a:buNone/>
             </a:pPr>
             <a:r>
-              <a:rPr lang="en-US" sz="1000" spc="300" dirty="0">
+              <a:rPr lang="en-US" sz="1100" spc="300">
                 <a:latin typeface="Source Code Pro" panose="020B0509030403020204" pitchFamily="49" charset="0"/>
                 <a:ea typeface="Source Code Pro" panose="020B0509030403020204" pitchFamily="49" charset="0"/>
               </a:rPr>
-              <a:t>(q / r)  = 357518 / 2^16   </a:t>
+              <a:t>                        (</a:t>
             </a:r>
             <a:r>
-              <a:rPr lang="en-US" sz="1000" spc="300" dirty="0">
+              <a:rPr lang="en-US" sz="1100" spc="300" dirty="0">
+                <a:latin typeface="Source Code Pro" panose="020B0509030403020204" pitchFamily="49" charset="0"/>
+                <a:ea typeface="Source Code Pro" panose="020B0509030403020204" pitchFamily="49" charset="0"/>
+              </a:rPr>
+              <a:t>q / r)  = 357518 / 2^16      </a:t>
+            </a:r>
+            <a:r>
+              <a:rPr lang="en-US" sz="1100" spc="300" dirty="0">
                 <a:latin typeface="Source Code Pro" panose="020B0509030403020204" pitchFamily="49" charset="0"/>
                 <a:ea typeface="Source Code Pro" panose="020B0509030403020204" pitchFamily="49" charset="0"/>
                 <a:sym typeface="Wingdings" pitchFamily="2" charset="2"/>
@@ -8397,34 +8438,41 @@
               <a:t> (5 29838)</a:t>
             </a:r>
             <a:br>
-              <a:rPr lang="en-US" sz="1000" spc="300" dirty="0">
+              <a:rPr lang="en-US" sz="1100" spc="300" dirty="0">
                 <a:latin typeface="Source Code Pro" panose="020B0509030403020204" pitchFamily="49" charset="0"/>
                 <a:ea typeface="Source Code Pro" panose="020B0509030403020204" pitchFamily="49" charset="0"/>
               </a:rPr>
             </a:br>
             <a:r>
-              <a:rPr lang="en-US" sz="1000" spc="300" dirty="0">
+              <a:rPr lang="en-US" sz="1100" spc="300">
                 <a:latin typeface="Source Code Pro" panose="020B0509030403020204" pitchFamily="49" charset="0"/>
                 <a:ea typeface="Source Code Pro" panose="020B0509030403020204" pitchFamily="49" charset="0"/>
               </a:rPr>
-              <a:t>checksum = </a:t>
+              <a:t>                        checksum </a:t>
             </a:r>
             <a:r>
-              <a:rPr lang="en-US" sz="1000" spc="300" dirty="0" err="1">
+              <a:rPr lang="en-US" sz="1100" spc="300" dirty="0">
+                <a:latin typeface="Source Code Pro" panose="020B0509030403020204" pitchFamily="49" charset="0"/>
+                <a:ea typeface="Source Code Pro" panose="020B0509030403020204" pitchFamily="49" charset="0"/>
+              </a:rPr>
+              <a:t>= </a:t>
+            </a:r>
+            <a:r>
+              <a:rPr lang="en-US" sz="1100" spc="300" dirty="0" err="1">
                 <a:latin typeface="Source Code Pro" panose="020B0509030403020204" pitchFamily="49" charset="0"/>
                 <a:ea typeface="Source Code Pro" panose="020B0509030403020204" pitchFamily="49" charset="0"/>
               </a:rPr>
               <a:t>max_int</a:t>
             </a:r>
             <a:r>
-              <a:rPr lang="en-US" sz="1000" spc="300" dirty="0">
+              <a:rPr lang="en-US" sz="1100" spc="300" dirty="0">
                 <a:latin typeface="Source Code Pro" panose="020B0509030403020204" pitchFamily="49" charset="0"/>
                 <a:ea typeface="Source Code Pro" panose="020B0509030403020204" pitchFamily="49" charset="0"/>
               </a:rPr>
               <a:t> - (q + r)  </a:t>
             </a:r>
             <a:r>
-              <a:rPr lang="en-US" sz="1000" spc="300" dirty="0">
+              <a:rPr lang="en-US" sz="1100" spc="300" dirty="0">
                 <a:latin typeface="Source Code Pro" panose="020B0509030403020204" pitchFamily="49" charset="0"/>
                 <a:ea typeface="Source Code Pro" panose="020B0509030403020204" pitchFamily="49" charset="0"/>
                 <a:sym typeface="Wingdings" pitchFamily="2" charset="2"/>
@@ -8432,13 +8480,13 @@
               <a:t> 35692</a:t>
             </a:r>
             <a:br>
-              <a:rPr lang="en-US" sz="1000" spc="300" dirty="0">
+              <a:rPr lang="en-US" sz="1100" spc="300" dirty="0">
                 <a:latin typeface="Source Code Pro" panose="020B0509030403020204" pitchFamily="49" charset="0"/>
                 <a:ea typeface="Source Code Pro" panose="020B0509030403020204" pitchFamily="49" charset="0"/>
                 <a:sym typeface="Wingdings" pitchFamily="2" charset="2"/>
               </a:rPr>
             </a:br>
-            <a:endParaRPr lang="en-US" sz="1000" spc="300" dirty="0">
+            <a:endParaRPr lang="en-US" sz="1100" spc="300" dirty="0">
               <a:latin typeface="Source Code Pro" panose="020B0509030403020204" pitchFamily="49" charset="0"/>
               <a:ea typeface="Source Code Pro" panose="020B0509030403020204" pitchFamily="49" charset="0"/>
               <a:sym typeface="Wingdings" pitchFamily="2" charset="2"/>
@@ -8448,7 +8496,7 @@
             <a:pPr marL="139700" indent="0">
               <a:buNone/>
             </a:pPr>
-            <a:endParaRPr lang="en-US" sz="1000" spc="300" dirty="0">
+            <a:endParaRPr lang="en-US" sz="1100" spc="300" dirty="0">
               <a:latin typeface="Source Code Pro" panose="020B0509030403020204" pitchFamily="49" charset="0"/>
               <a:ea typeface="Source Code Pro" panose="020B0509030403020204" pitchFamily="49" charset="0"/>
               <a:sym typeface="Wingdings" pitchFamily="2" charset="2"/>
@@ -8459,43 +8507,14 @@
               <a:buNone/>
             </a:pPr>
             <a:r>
-              <a:rPr lang="en-US" sz="1000" spc="300" dirty="0">
+              <a:rPr lang="en-US" sz="1100" spc="300" dirty="0">
                 <a:latin typeface="Source Code Pro" panose="020B0509030403020204" pitchFamily="49" charset="0"/>
                 <a:ea typeface="Source Code Pro" panose="020B0509030403020204" pitchFamily="49" charset="0"/>
                 <a:sym typeface="Wingdings" pitchFamily="2" charset="2"/>
               </a:rPr>
-              <a:t>                                   2^16 = 65536</a:t>
+              <a:t>                                   </a:t>
             </a:r>
-          </a:p>
-          <a:p>
-            <a:pPr marL="139700" indent="0">
-              <a:buNone/>
-            </a:pPr>
-            <a:r>
-              <a:rPr lang="en-US" sz="1000" spc="300" dirty="0">
-                <a:latin typeface="Source Code Pro" panose="020B0509030403020204" pitchFamily="49" charset="0"/>
-                <a:ea typeface="Source Code Pro" panose="020B0509030403020204" pitchFamily="49" charset="0"/>
-                <a:sym typeface="Wingdings" pitchFamily="2" charset="2"/>
-              </a:rPr>
-              <a:t>                                </a:t>
-            </a:r>
-            <a:r>
-              <a:rPr lang="en-US" sz="1000" spc="300" dirty="0" err="1">
-                <a:latin typeface="Source Code Pro" panose="020B0509030403020204" pitchFamily="49" charset="0"/>
-                <a:ea typeface="Source Code Pro" panose="020B0509030403020204" pitchFamily="49" charset="0"/>
-                <a:sym typeface="Wingdings" pitchFamily="2" charset="2"/>
-              </a:rPr>
-              <a:t>max_int</a:t>
-            </a:r>
-            <a:r>
-              <a:rPr lang="en-US" sz="1000" spc="300" dirty="0">
-                <a:latin typeface="Source Code Pro" panose="020B0509030403020204" pitchFamily="49" charset="0"/>
-                <a:ea typeface="Source Code Pro" panose="020B0509030403020204" pitchFamily="49" charset="0"/>
-                <a:sym typeface="Wingdings" pitchFamily="2" charset="2"/>
-              </a:rPr>
-              <a:t> = 65535</a:t>
-            </a:r>
-            <a:endParaRPr lang="en-US" sz="1000" dirty="0">
+            <a:endParaRPr lang="en-US" sz="1100" dirty="0">
               <a:latin typeface="Source Code Pro" panose="020B0509030403020204" pitchFamily="49" charset="0"/>
               <a:ea typeface="Source Code Pro" panose="020B0509030403020204" pitchFamily="49" charset="0"/>
             </a:endParaRPr>
@@ -8517,8 +8536,8 @@
         </p:blipFill>
         <p:spPr>
           <a:xfrm>
-            <a:off x="3566160" y="463371"/>
-            <a:ext cx="5577840" cy="1378208"/>
+            <a:off x="3012519" y="65320"/>
+            <a:ext cx="6131481" cy="1515005"/>
           </a:xfrm>
           <a:prstGeom prst="rect">
             <a:avLst/>
@@ -8543,7 +8562,7 @@
         </p:nvCxnSpPr>
         <p:spPr>
           <a:xfrm>
-            <a:off x="2396062" y="3076428"/>
+            <a:off x="3081862" y="3598936"/>
             <a:ext cx="1005840" cy="0"/>
           </a:xfrm>
           <a:prstGeom prst="line">
@@ -8816,15 +8835,133 @@
         </p:nvSpPr>
         <p:spPr>
           <a:xfrm>
-            <a:off x="2029151" y="1230217"/>
-            <a:ext cx="5345315" cy="3416400"/>
+            <a:off x="2367643" y="1152475"/>
+            <a:ext cx="5855909" cy="3416400"/>
           </a:xfrm>
         </p:spPr>
         <p:txBody>
           <a:bodyPr>
-            <a:normAutofit lnSpcReduction="10000"/>
+            <a:normAutofit/>
           </a:bodyPr>
           <a:lstStyle/>
+          <a:p>
+            <a:pPr marL="139700" indent="0">
+              <a:buNone/>
+            </a:pPr>
+            <a:r>
+              <a:rPr lang="en-US" sz="1400" spc="300" dirty="0">
+                <a:latin typeface="Source Code Pro" panose="020B0509030403020204" pitchFamily="49" charset="0"/>
+                <a:ea typeface="Source Code Pro" panose="020B0509030403020204" pitchFamily="49" charset="0"/>
+                <a:sym typeface="Wingdings" pitchFamily="2" charset="2"/>
+              </a:rPr>
+              <a:t>                         2^8 = 256</a:t>
+            </a:r>
+          </a:p>
+          <a:p>
+            <a:pPr marL="139700" indent="0">
+              <a:buNone/>
+            </a:pPr>
+            <a:r>
+              <a:rPr lang="en-US" spc="300" dirty="0">
+                <a:latin typeface="Source Code Pro" panose="020B0509030403020204" pitchFamily="49" charset="0"/>
+                <a:ea typeface="Source Code Pro" panose="020B0509030403020204" pitchFamily="49" charset="0"/>
+                <a:sym typeface="Wingdings" pitchFamily="2" charset="2"/>
+              </a:rPr>
+              <a:t>                     </a:t>
+            </a:r>
+            <a:r>
+              <a:rPr lang="en-US" spc="300" dirty="0" err="1">
+                <a:latin typeface="Source Code Pro" panose="020B0509030403020204" pitchFamily="49" charset="0"/>
+                <a:ea typeface="Source Code Pro" panose="020B0509030403020204" pitchFamily="49" charset="0"/>
+                <a:sym typeface="Wingdings" pitchFamily="2" charset="2"/>
+              </a:rPr>
+              <a:t>max_int</a:t>
+            </a:r>
+            <a:r>
+              <a:rPr lang="en-US" spc="300" dirty="0">
+                <a:latin typeface="Source Code Pro" panose="020B0509030403020204" pitchFamily="49" charset="0"/>
+                <a:ea typeface="Source Code Pro" panose="020B0509030403020204" pitchFamily="49" charset="0"/>
+                <a:sym typeface="Wingdings" pitchFamily="2" charset="2"/>
+              </a:rPr>
+              <a:t> = 255</a:t>
+            </a:r>
+            <a:endParaRPr lang="en-US" sz="1400" spc="300" dirty="0">
+              <a:latin typeface="Source Code Pro" panose="020B0509030403020204" pitchFamily="49" charset="0"/>
+              <a:ea typeface="Source Code Pro" panose="020B0509030403020204" pitchFamily="49" charset="0"/>
+            </a:endParaRPr>
+          </a:p>
+          <a:p>
+            <a:pPr marL="139700" indent="0">
+              <a:buNone/>
+            </a:pPr>
+            <a:endParaRPr lang="en-US" sz="1400" spc="300" dirty="0">
+              <a:latin typeface="Source Code Pro" panose="020B0509030403020204" pitchFamily="49" charset="0"/>
+              <a:ea typeface="Source Code Pro" panose="020B0509030403020204" pitchFamily="49" charset="0"/>
+            </a:endParaRPr>
+          </a:p>
+          <a:p>
+            <a:pPr marL="139700" indent="0">
+              <a:buNone/>
+            </a:pPr>
+            <a:endParaRPr lang="en-US" sz="1400" spc="300" dirty="0">
+              <a:latin typeface="Source Code Pro" panose="020B0509030403020204" pitchFamily="49" charset="0"/>
+              <a:ea typeface="Source Code Pro" panose="020B0509030403020204" pitchFamily="49" charset="0"/>
+            </a:endParaRPr>
+          </a:p>
+          <a:p>
+            <a:pPr marL="139700" indent="0">
+              <a:buNone/>
+            </a:pPr>
+            <a:endParaRPr lang="en-US" sz="1400" spc="300" dirty="0">
+              <a:latin typeface="Source Code Pro" panose="020B0509030403020204" pitchFamily="49" charset="0"/>
+              <a:ea typeface="Source Code Pro" panose="020B0509030403020204" pitchFamily="49" charset="0"/>
+            </a:endParaRPr>
+          </a:p>
+          <a:p>
+            <a:pPr marL="139700" indent="0">
+              <a:buNone/>
+            </a:pPr>
+            <a:endParaRPr lang="en-US" spc="300" dirty="0">
+              <a:latin typeface="Source Code Pro" panose="020B0509030403020204" pitchFamily="49" charset="0"/>
+              <a:ea typeface="Source Code Pro" panose="020B0509030403020204" pitchFamily="49" charset="0"/>
+            </a:endParaRPr>
+          </a:p>
+          <a:p>
+            <a:pPr marL="139700" indent="0">
+              <a:buNone/>
+            </a:pPr>
+            <a:endParaRPr lang="en-US" sz="1400" spc="300" dirty="0">
+              <a:latin typeface="Source Code Pro" panose="020B0509030403020204" pitchFamily="49" charset="0"/>
+              <a:ea typeface="Source Code Pro" panose="020B0509030403020204" pitchFamily="49" charset="0"/>
+            </a:endParaRPr>
+          </a:p>
+          <a:p>
+            <a:pPr marL="139700" indent="0">
+              <a:buNone/>
+            </a:pPr>
+            <a:endParaRPr lang="en-US" spc="300" dirty="0">
+              <a:latin typeface="Source Code Pro" panose="020B0509030403020204" pitchFamily="49" charset="0"/>
+              <a:ea typeface="Source Code Pro" panose="020B0509030403020204" pitchFamily="49" charset="0"/>
+            </a:endParaRPr>
+          </a:p>
+          <a:p>
+            <a:pPr marL="139700" indent="0">
+              <a:buNone/>
+            </a:pPr>
+            <a:endParaRPr lang="en-US" sz="1400" spc="300" dirty="0">
+              <a:latin typeface="Source Code Pro" panose="020B0509030403020204" pitchFamily="49" charset="0"/>
+              <a:ea typeface="Source Code Pro" panose="020B0509030403020204" pitchFamily="49" charset="0"/>
+            </a:endParaRPr>
+          </a:p>
+          <a:p>
+            <a:pPr marL="139700" indent="0">
+              <a:buNone/>
+            </a:pPr>
+            <a:endParaRPr lang="en-US" spc="300" dirty="0">
+              <a:latin typeface="Source Code Pro" panose="020B0509030403020204" pitchFamily="49" charset="0"/>
+              <a:ea typeface="Source Code Pro" panose="020B0509030403020204" pitchFamily="49" charset="0"/>
+            </a:endParaRPr>
+          </a:p>
           <a:p>
             <a:pPr marL="139700" indent="0">
               <a:buNone/>
@@ -8834,7 +8971,7 @@
                 <a:latin typeface="Source Code Pro" panose="020B0509030403020204" pitchFamily="49" charset="0"/>
                 <a:ea typeface="Source Code Pro" panose="020B0509030403020204" pitchFamily="49" charset="0"/>
               </a:rPr>
-              <a:t>(q / r)  = 354 / 2^8 </a:t>
+              <a:t>(q / r)  = 354 / 2^8         </a:t>
             </a:r>
             <a:r>
               <a:rPr lang="en-US" sz="1400" spc="300" dirty="0">
@@ -8980,52 +9117,6 @@
               <a:latin typeface="Source Code Pro" panose="020B0509030403020204" pitchFamily="49" charset="0"/>
               <a:ea typeface="Source Code Pro" panose="020B0509030403020204" pitchFamily="49" charset="0"/>
               <a:sym typeface="Wingdings" pitchFamily="2" charset="2"/>
-            </a:endParaRPr>
-          </a:p>
-          <a:p>
-            <a:pPr marL="139700" indent="0">
-              <a:buNone/>
-            </a:pPr>
-            <a:r>
-              <a:rPr lang="en-US" sz="1400" spc="300" dirty="0">
-                <a:latin typeface="Source Code Pro" panose="020B0509030403020204" pitchFamily="49" charset="0"/>
-                <a:ea typeface="Source Code Pro" panose="020B0509030403020204" pitchFamily="49" charset="0"/>
-                <a:sym typeface="Wingdings" pitchFamily="2" charset="2"/>
-              </a:rPr>
-              <a:t>                         2^8 = 256</a:t>
-            </a:r>
-          </a:p>
-          <a:p>
-            <a:pPr marL="139700" indent="0">
-              <a:buNone/>
-            </a:pPr>
-            <a:r>
-              <a:rPr lang="en-US" spc="300" dirty="0">
-                <a:latin typeface="Source Code Pro" panose="020B0509030403020204" pitchFamily="49" charset="0"/>
-                <a:ea typeface="Source Code Pro" panose="020B0509030403020204" pitchFamily="49" charset="0"/>
-                <a:sym typeface="Wingdings" pitchFamily="2" charset="2"/>
-              </a:rPr>
-              <a:t>                     </a:t>
-            </a:r>
-            <a:r>
-              <a:rPr lang="en-US" spc="300" dirty="0" err="1">
-                <a:latin typeface="Source Code Pro" panose="020B0509030403020204" pitchFamily="49" charset="0"/>
-                <a:ea typeface="Source Code Pro" panose="020B0509030403020204" pitchFamily="49" charset="0"/>
-                <a:sym typeface="Wingdings" pitchFamily="2" charset="2"/>
-              </a:rPr>
-              <a:t>max_int</a:t>
-            </a:r>
-            <a:r>
-              <a:rPr lang="en-US" spc="300" dirty="0">
-                <a:latin typeface="Source Code Pro" panose="020B0509030403020204" pitchFamily="49" charset="0"/>
-                <a:ea typeface="Source Code Pro" panose="020B0509030403020204" pitchFamily="49" charset="0"/>
-                <a:sym typeface="Wingdings" pitchFamily="2" charset="2"/>
-              </a:rPr>
-              <a:t> = 255</a:t>
-            </a:r>
-            <a:endParaRPr lang="en-US" sz="1400" dirty="0">
-              <a:latin typeface="Source Code Pro" panose="020B0509030403020204" pitchFamily="49" charset="0"/>
-              <a:ea typeface="Source Code Pro" panose="020B0509030403020204" pitchFamily="49" charset="0"/>
             </a:endParaRPr>
           </a:p>
           <a:p>

</xml_diff>

<commit_message>
added slide for 229_error.txt
</commit_message>
<xml_diff>
--- a/format-encodings/slide_presentations/.hidden/checksum.pptx
+++ b/format-encodings/slide_presentations/.hidden/checksum.pptx
@@ -5,7 +5,7 @@
     <p:sldMasterId id="2147483659" r:id="rId1"/>
   </p:sldMasterIdLst>
   <p:notesMasterIdLst>
-    <p:notesMasterId r:id="rId7"/>
+    <p:notesMasterId r:id="rId8"/>
   </p:notesMasterIdLst>
   <p:sldIdLst>
     <p:sldId id="258" r:id="rId2"/>
@@ -13,6 +13,7 @@
     <p:sldId id="262" r:id="rId4"/>
     <p:sldId id="261" r:id="rId5"/>
     <p:sldId id="263" r:id="rId6"/>
+    <p:sldId id="264" r:id="rId7"/>
   </p:sldIdLst>
   <p:sldSz cx="9144000" cy="5143500" type="screen16x9"/>
   <p:notesSz cx="6858000" cy="9144000"/>
@@ -7998,6 +7999,73 @@
       </p:grpSpPr>
       <p:sp>
         <p:nvSpPr>
+          <p:cNvPr id="4" name="Oval 3">
+            <a:extLst>
+              <a:ext uri="{FF2B5EF4-FFF2-40B4-BE49-F238E27FC236}">
+                <a16:creationId xmlns:a16="http://schemas.microsoft.com/office/drawing/2014/main" id="{CD3A8C75-9D77-7BB2-BB48-12AEBFDA4682}"/>
+              </a:ext>
+            </a:extLst>
+          </p:cNvPr>
+          <p:cNvSpPr/>
+          <p:nvPr/>
+        </p:nvSpPr>
+        <p:spPr>
+          <a:xfrm>
+            <a:off x="5723112" y="4339247"/>
+            <a:ext cx="710293" cy="326572"/>
+          </a:xfrm>
+          <a:prstGeom prst="ellipse">
+            <a:avLst/>
+          </a:prstGeom>
+          <a:solidFill>
+            <a:schemeClr val="accent1">
+              <a:lumMod val="20000"/>
+              <a:lumOff val="80000"/>
+            </a:schemeClr>
+          </a:solidFill>
+          <a:ln>
+            <a:solidFill>
+              <a:schemeClr val="accent1">
+                <a:lumMod val="20000"/>
+                <a:lumOff val="80000"/>
+              </a:schemeClr>
+            </a:solidFill>
+          </a:ln>
+        </p:spPr>
+        <p:style>
+          <a:lnRef idx="2">
+            <a:schemeClr val="accent1">
+              <a:shade val="50000"/>
+            </a:schemeClr>
+          </a:lnRef>
+          <a:fillRef idx="1">
+            <a:schemeClr val="accent1"/>
+          </a:fillRef>
+          <a:effectRef idx="0">
+            <a:schemeClr val="accent1"/>
+          </a:effectRef>
+          <a:fontRef idx="minor">
+            <a:schemeClr val="lt1"/>
+          </a:fontRef>
+        </p:style>
+        <p:txBody>
+          <a:bodyPr rtlCol="0" anchor="ctr"/>
+          <a:lstStyle/>
+          <a:p>
+            <a:pPr algn="ctr"/>
+            <a:endParaRPr lang="en-US">
+              <a:solidFill>
+                <a:schemeClr val="accent1">
+                  <a:lumMod val="20000"/>
+                  <a:lumOff val="80000"/>
+                </a:schemeClr>
+              </a:solidFill>
+            </a:endParaRPr>
+          </a:p>
+        </p:txBody>
+      </p:sp>
+      <p:sp>
+        <p:nvSpPr>
           <p:cNvPr id="83" name="Google Shape;83;p17"/>
           <p:cNvSpPr txBox="1">
             <a:spLocks noGrp="1"/>
@@ -8031,6 +8099,66 @@
               <a:t>Checksum Calc</a:t>
             </a:r>
             <a:endParaRPr dirty="0"/>
+          </a:p>
+        </p:txBody>
+      </p:sp>
+      <p:sp>
+        <p:nvSpPr>
+          <p:cNvPr id="3" name="Oval 2">
+            <a:extLst>
+              <a:ext uri="{FF2B5EF4-FFF2-40B4-BE49-F238E27FC236}">
+                <a16:creationId xmlns:a16="http://schemas.microsoft.com/office/drawing/2014/main" id="{6BB0902D-CD5B-9E5B-C750-7D963ED129EC}"/>
+              </a:ext>
+            </a:extLst>
+          </p:cNvPr>
+          <p:cNvSpPr/>
+          <p:nvPr/>
+        </p:nvSpPr>
+        <p:spPr>
+          <a:xfrm>
+            <a:off x="4310743" y="2620736"/>
+            <a:ext cx="710293" cy="326572"/>
+          </a:xfrm>
+          <a:prstGeom prst="ellipse">
+            <a:avLst/>
+          </a:prstGeom>
+          <a:solidFill>
+            <a:schemeClr val="accent1">
+              <a:lumMod val="20000"/>
+              <a:lumOff val="80000"/>
+            </a:schemeClr>
+          </a:solidFill>
+          <a:ln>
+            <a:solidFill>
+              <a:schemeClr val="accent1">
+                <a:lumMod val="20000"/>
+                <a:lumOff val="80000"/>
+              </a:schemeClr>
+            </a:solidFill>
+          </a:ln>
+        </p:spPr>
+        <p:style>
+          <a:lnRef idx="2">
+            <a:schemeClr val="accent1">
+              <a:shade val="50000"/>
+            </a:schemeClr>
+          </a:lnRef>
+          <a:fillRef idx="1">
+            <a:schemeClr val="accent1"/>
+          </a:fillRef>
+          <a:effectRef idx="0">
+            <a:schemeClr val="accent1"/>
+          </a:effectRef>
+          <a:fontRef idx="minor">
+            <a:schemeClr val="lt1"/>
+          </a:fontRef>
+        </p:style>
+        <p:txBody>
+          <a:bodyPr rtlCol="0" anchor="ctr"/>
+          <a:lstStyle/>
+          <a:p>
+            <a:pPr algn="ctr"/>
+            <a:endParaRPr lang="en-US" dirty="0"/>
           </a:p>
         </p:txBody>
       </p:sp>
@@ -8265,16 +8393,31 @@
                 <a:ea typeface="Source Code Pro" panose="020B0509030403020204" pitchFamily="49" charset="0"/>
                 <a:cs typeface="Courier New" panose="02070309020205020404" pitchFamily="49" charset="0"/>
               </a:rPr>
-              <a:t>     0 </a:t>
-            </a:r>
-            <a:r>
-              <a:rPr lang="en-US" sz="1100" strike="sngStrike" spc="300" dirty="0">
+              <a:t>     0 35692 </a:t>
+            </a:r>
+            <a:r>
+              <a:rPr lang="en-US" sz="1100" spc="300" dirty="0">
                 <a:latin typeface="Source Code Pro" panose="020B0509030403020204" pitchFamily="49" charset="0"/>
                 <a:ea typeface="Source Code Pro" panose="020B0509030403020204" pitchFamily="49" charset="0"/>
                 <a:cs typeface="Courier New" panose="02070309020205020404" pitchFamily="49" charset="0"/>
-              </a:rPr>
-              <a:t>35692</a:t>
-            </a:r>
+                <a:sym typeface="Wingdings" pitchFamily="2" charset="2"/>
+              </a:rPr>
+              <a:t> </a:t>
+            </a:r>
+            <a:r>
+              <a:rPr lang="en-US" sz="1100" spc="300" dirty="0" err="1">
+                <a:latin typeface="Source Code Pro" panose="020B0509030403020204" pitchFamily="49" charset="0"/>
+                <a:ea typeface="Source Code Pro" panose="020B0509030403020204" pitchFamily="49" charset="0"/>
+                <a:cs typeface="Courier New" panose="02070309020205020404" pitchFamily="49" charset="0"/>
+                <a:sym typeface="Wingdings" pitchFamily="2" charset="2"/>
+              </a:rPr>
+              <a:t>header_checksum</a:t>
+            </a:r>
+            <a:endParaRPr lang="en-US" sz="1100" spc="300" dirty="0">
+              <a:latin typeface="Source Code Pro" panose="020B0509030403020204" pitchFamily="49" charset="0"/>
+              <a:ea typeface="Source Code Pro" panose="020B0509030403020204" pitchFamily="49" charset="0"/>
+              <a:cs typeface="Courier New" panose="02070309020205020404" pitchFamily="49" charset="0"/>
+            </a:endParaRPr>
           </a:p>
           <a:p>
             <a:r>
@@ -8399,7 +8542,21 @@
                 <a:latin typeface="Source Code Pro" panose="020B0509030403020204" pitchFamily="49" charset="0"/>
                 <a:ea typeface="Source Code Pro" panose="020B0509030403020204" pitchFamily="49" charset="0"/>
               </a:rPr>
-              <a:t>                  sum = 357518</a:t>
+              <a:t>                  sum = 357518 (without the </a:t>
+            </a:r>
+            <a:r>
+              <a:rPr lang="en-US" sz="1100" spc="300" dirty="0" err="1">
+                <a:latin typeface="Source Code Pro" panose="020B0509030403020204" pitchFamily="49" charset="0"/>
+                <a:ea typeface="Source Code Pro" panose="020B0509030403020204" pitchFamily="49" charset="0"/>
+              </a:rPr>
+              <a:t>header_checksum</a:t>
+            </a:r>
+            <a:r>
+              <a:rPr lang="en-US" sz="1100" spc="300" dirty="0">
+                <a:latin typeface="Source Code Pro" panose="020B0509030403020204" pitchFamily="49" charset="0"/>
+                <a:ea typeface="Source Code Pro" panose="020B0509030403020204" pitchFamily="49" charset="0"/>
+              </a:rPr>
+              <a:t>)</a:t>
             </a:r>
           </a:p>
           <a:p>
@@ -8416,18 +8573,11 @@
               <a:buNone/>
             </a:pPr>
             <a:r>
-              <a:rPr lang="en-US" sz="1100" spc="300">
-                <a:latin typeface="Source Code Pro" panose="020B0509030403020204" pitchFamily="49" charset="0"/>
-                <a:ea typeface="Source Code Pro" panose="020B0509030403020204" pitchFamily="49" charset="0"/>
-              </a:rPr>
-              <a:t>                        (</a:t>
-            </a:r>
-            <a:r>
               <a:rPr lang="en-US" sz="1100" spc="300" dirty="0">
                 <a:latin typeface="Source Code Pro" panose="020B0509030403020204" pitchFamily="49" charset="0"/>
                 <a:ea typeface="Source Code Pro" panose="020B0509030403020204" pitchFamily="49" charset="0"/>
               </a:rPr>
-              <a:t>q / r)  = 357518 / 2^16      </a:t>
+              <a:t>          (q / r)  = 357518 / 2^16      </a:t>
             </a:r>
             <a:r>
               <a:rPr lang="en-US" sz="1100" spc="300" dirty="0">
@@ -8444,18 +8594,11 @@
               </a:rPr>
             </a:br>
             <a:r>
-              <a:rPr lang="en-US" sz="1100" spc="300">
-                <a:latin typeface="Source Code Pro" panose="020B0509030403020204" pitchFamily="49" charset="0"/>
-                <a:ea typeface="Source Code Pro" panose="020B0509030403020204" pitchFamily="49" charset="0"/>
-              </a:rPr>
-              <a:t>                        checksum </a:t>
-            </a:r>
-            <a:r>
               <a:rPr lang="en-US" sz="1100" spc="300" dirty="0">
                 <a:latin typeface="Source Code Pro" panose="020B0509030403020204" pitchFamily="49" charset="0"/>
                 <a:ea typeface="Source Code Pro" panose="020B0509030403020204" pitchFamily="49" charset="0"/>
               </a:rPr>
-              <a:t>= </a:t>
+              <a:t>          checksum = </a:t>
             </a:r>
             <a:r>
               <a:rPr lang="en-US" sz="1100" spc="300" dirty="0" err="1">
@@ -8478,6 +8621,50 @@
                 <a:sym typeface="Wingdings" pitchFamily="2" charset="2"/>
               </a:rPr>
               <a:t> 35692</a:t>
+            </a:r>
+          </a:p>
+          <a:p>
+            <a:pPr marL="139700" indent="0">
+              <a:buNone/>
+            </a:pPr>
+            <a:r>
+              <a:rPr lang="en-US" sz="1100" spc="300" dirty="0">
+                <a:latin typeface="Source Code Pro" panose="020B0509030403020204" pitchFamily="49" charset="0"/>
+                <a:ea typeface="Source Code Pro" panose="020B0509030403020204" pitchFamily="49" charset="0"/>
+                <a:sym typeface="Wingdings" pitchFamily="2" charset="2"/>
+              </a:rPr>
+              <a:t>         (</a:t>
+            </a:r>
+            <a:r>
+              <a:rPr lang="en-US" sz="1100" spc="300" dirty="0" err="1">
+                <a:latin typeface="Source Code Pro" panose="020B0509030403020204" pitchFamily="49" charset="0"/>
+                <a:ea typeface="Source Code Pro" panose="020B0509030403020204" pitchFamily="49" charset="0"/>
+                <a:sym typeface="Wingdings" pitchFamily="2" charset="2"/>
+              </a:rPr>
+              <a:t>header_checksum</a:t>
+            </a:r>
+            <a:r>
+              <a:rPr lang="en-US" sz="1100" spc="300" dirty="0">
+                <a:latin typeface="Source Code Pro" panose="020B0509030403020204" pitchFamily="49" charset="0"/>
+                <a:ea typeface="Source Code Pro" panose="020B0509030403020204" pitchFamily="49" charset="0"/>
+                <a:sym typeface="Wingdings" pitchFamily="2" charset="2"/>
+              </a:rPr>
+              <a:t> == checksum ) ?  0 : error </a:t>
+            </a:r>
+            <a:r>
+              <a:rPr lang="en-US" sz="1100" spc="300" dirty="0">
+                <a:latin typeface="Source Code Pro" panose="020B0509030403020204" pitchFamily="49" charset="0"/>
+                <a:ea typeface="Source Code Pro" panose="020B0509030403020204" pitchFamily="49" charset="0"/>
+              </a:rPr>
+              <a:t> </a:t>
+            </a:r>
+            <a:r>
+              <a:rPr lang="en-US" sz="1100" spc="300" dirty="0">
+                <a:latin typeface="Source Code Pro" panose="020B0509030403020204" pitchFamily="49" charset="0"/>
+                <a:ea typeface="Source Code Pro" panose="020B0509030403020204" pitchFamily="49" charset="0"/>
+                <a:sym typeface="Wingdings" pitchFamily="2" charset="2"/>
+              </a:rPr>
+              <a:t> 0 </a:t>
             </a:r>
             <a:br>
               <a:rPr lang="en-US" sz="1100" spc="300" dirty="0">
@@ -8585,6 +8772,48 @@
           </a:fontRef>
         </p:style>
       </p:cxnSp>
+      <p:cxnSp>
+        <p:nvCxnSpPr>
+          <p:cNvPr id="7" name="Curved Connector 6">
+            <a:extLst>
+              <a:ext uri="{FF2B5EF4-FFF2-40B4-BE49-F238E27FC236}">
+                <a16:creationId xmlns:a16="http://schemas.microsoft.com/office/drawing/2014/main" id="{FBD236F4-0517-9C05-F801-14285D2E1F14}"/>
+              </a:ext>
+            </a:extLst>
+          </p:cNvPr>
+          <p:cNvCxnSpPr>
+            <a:cxnSpLocks/>
+          </p:cNvCxnSpPr>
+          <p:nvPr/>
+        </p:nvCxnSpPr>
+        <p:spPr>
+          <a:xfrm rot="16200000" flipH="1">
+            <a:off x="4478473" y="3164073"/>
+            <a:ext cx="1432057" cy="1057221"/>
+          </a:xfrm>
+          <a:prstGeom prst="curvedConnector3">
+            <a:avLst/>
+          </a:prstGeom>
+          <a:ln>
+            <a:headEnd type="triangle"/>
+            <a:tailEnd type="triangle"/>
+          </a:ln>
+        </p:spPr>
+        <p:style>
+          <a:lnRef idx="1">
+            <a:schemeClr val="accent1"/>
+          </a:lnRef>
+          <a:fillRef idx="0">
+            <a:schemeClr val="accent1"/>
+          </a:fillRef>
+          <a:effectRef idx="0">
+            <a:schemeClr val="accent1"/>
+          </a:effectRef>
+          <a:fontRef idx="minor">
+            <a:schemeClr val="tx1"/>
+          </a:fontRef>
+        </p:style>
+      </p:cxnSp>
     </p:spTree>
     <p:extLst>
       <p:ext uri="{BB962C8B-B14F-4D97-AF65-F5344CB8AC3E}">
@@ -8640,8 +8869,148 @@
           <a:p>
             <a:r>
               <a:rPr lang="en-US" dirty="0"/>
-              <a:t>Checksum: using 8-bits</a:t>
-            </a:r>
+              <a:t>Checksum: using </a:t>
+            </a:r>
+            <a:r>
+              <a:rPr lang="en-US"/>
+              <a:t>8-bits  </a:t>
+            </a:r>
+            <a:r>
+              <a:rPr lang="en-US" sz="2000"/>
+              <a:t>(from 156.</a:t>
+            </a:r>
+            <a:r>
+              <a:rPr lang="en-US" sz="2000" dirty="0"/>
+              <a:t>txt)</a:t>
+            </a:r>
+            <a:endParaRPr lang="en-US" dirty="0"/>
+          </a:p>
+        </p:txBody>
+      </p:sp>
+      <p:sp>
+        <p:nvSpPr>
+          <p:cNvPr id="5" name="Oval 4">
+            <a:extLst>
+              <a:ext uri="{FF2B5EF4-FFF2-40B4-BE49-F238E27FC236}">
+                <a16:creationId xmlns:a16="http://schemas.microsoft.com/office/drawing/2014/main" id="{DC76C097-557D-CF4A-37EF-CB567276591F}"/>
+              </a:ext>
+            </a:extLst>
+          </p:cNvPr>
+          <p:cNvSpPr/>
+          <p:nvPr/>
+        </p:nvSpPr>
+        <p:spPr>
+          <a:xfrm>
+            <a:off x="7732312" y="3486077"/>
+            <a:ext cx="710293" cy="326572"/>
+          </a:xfrm>
+          <a:prstGeom prst="ellipse">
+            <a:avLst/>
+          </a:prstGeom>
+          <a:solidFill>
+            <a:schemeClr val="accent1">
+              <a:lumMod val="20000"/>
+              <a:lumOff val="80000"/>
+            </a:schemeClr>
+          </a:solidFill>
+          <a:ln>
+            <a:solidFill>
+              <a:schemeClr val="accent1">
+                <a:lumMod val="20000"/>
+                <a:lumOff val="80000"/>
+              </a:schemeClr>
+            </a:solidFill>
+          </a:ln>
+        </p:spPr>
+        <p:style>
+          <a:lnRef idx="2">
+            <a:schemeClr val="accent1">
+              <a:shade val="50000"/>
+            </a:schemeClr>
+          </a:lnRef>
+          <a:fillRef idx="1">
+            <a:schemeClr val="accent1"/>
+          </a:fillRef>
+          <a:effectRef idx="0">
+            <a:schemeClr val="accent1"/>
+          </a:effectRef>
+          <a:fontRef idx="minor">
+            <a:schemeClr val="lt1"/>
+          </a:fontRef>
+        </p:style>
+        <p:txBody>
+          <a:bodyPr rtlCol="0" anchor="ctr"/>
+          <a:lstStyle/>
+          <a:p>
+            <a:pPr algn="ctr"/>
+            <a:endParaRPr lang="en-US">
+              <a:solidFill>
+                <a:schemeClr val="accent1">
+                  <a:lumMod val="20000"/>
+                  <a:lumOff val="80000"/>
+                </a:schemeClr>
+              </a:solidFill>
+            </a:endParaRPr>
+          </a:p>
+        </p:txBody>
+      </p:sp>
+      <p:sp>
+        <p:nvSpPr>
+          <p:cNvPr id="7" name="Oval 6">
+            <a:extLst>
+              <a:ext uri="{FF2B5EF4-FFF2-40B4-BE49-F238E27FC236}">
+                <a16:creationId xmlns:a16="http://schemas.microsoft.com/office/drawing/2014/main" id="{5976414C-A95D-689D-F189-791D4331E01C}"/>
+              </a:ext>
+            </a:extLst>
+          </p:cNvPr>
+          <p:cNvSpPr/>
+          <p:nvPr/>
+        </p:nvSpPr>
+        <p:spPr>
+          <a:xfrm>
+            <a:off x="1455506" y="2408464"/>
+            <a:ext cx="710293" cy="326572"/>
+          </a:xfrm>
+          <a:prstGeom prst="ellipse">
+            <a:avLst/>
+          </a:prstGeom>
+          <a:solidFill>
+            <a:schemeClr val="accent1">
+              <a:lumMod val="20000"/>
+              <a:lumOff val="80000"/>
+            </a:schemeClr>
+          </a:solidFill>
+          <a:ln>
+            <a:solidFill>
+              <a:schemeClr val="accent1">
+                <a:lumMod val="20000"/>
+                <a:lumOff val="80000"/>
+              </a:schemeClr>
+            </a:solidFill>
+          </a:ln>
+        </p:spPr>
+        <p:style>
+          <a:lnRef idx="2">
+            <a:schemeClr val="accent1">
+              <a:shade val="50000"/>
+            </a:schemeClr>
+          </a:lnRef>
+          <a:fillRef idx="1">
+            <a:schemeClr val="accent1"/>
+          </a:fillRef>
+          <a:effectRef idx="0">
+            <a:schemeClr val="accent1"/>
+          </a:effectRef>
+          <a:fontRef idx="minor">
+            <a:schemeClr val="lt1"/>
+          </a:fontRef>
+        </p:style>
+        <p:txBody>
+          <a:bodyPr rtlCol="0" anchor="ctr"/>
+          <a:lstStyle/>
+          <a:p>
+            <a:pPr algn="ctr"/>
+            <a:endParaRPr lang="en-US" dirty="0"/>
           </a:p>
         </p:txBody>
       </p:sp>
@@ -8734,8 +9103,34 @@
                 <a:latin typeface="Source Code Pro" panose="020B0509030403020204" pitchFamily="49" charset="0"/>
                 <a:ea typeface="Source Code Pro" panose="020B0509030403020204" pitchFamily="49" charset="0"/>
               </a:rPr>
-              <a:t>    0   156: checksum</a:t>
-            </a:r>
+              <a:t>    0 </a:t>
+            </a:r>
+            <a:r>
+              <a:rPr lang="en-US" dirty="0">
+                <a:latin typeface="Source Code Pro" panose="020B0509030403020204" pitchFamily="49" charset="0"/>
+                <a:ea typeface="Source Code Pro" panose="020B0509030403020204" pitchFamily="49" charset="0"/>
+                <a:sym typeface="Wingdings" pitchFamily="2" charset="2"/>
+              </a:rPr>
+              <a:t></a:t>
+            </a:r>
+            <a:r>
+              <a:rPr lang="en-US" dirty="0">
+                <a:latin typeface="Source Code Pro" panose="020B0509030403020204" pitchFamily="49" charset="0"/>
+                <a:ea typeface="Source Code Pro" panose="020B0509030403020204" pitchFamily="49" charset="0"/>
+              </a:rPr>
+              <a:t>  156: </a:t>
+            </a:r>
+            <a:r>
+              <a:rPr lang="en-US" dirty="0" err="1">
+                <a:latin typeface="Source Code Pro" panose="020B0509030403020204" pitchFamily="49" charset="0"/>
+                <a:ea typeface="Source Code Pro" panose="020B0509030403020204" pitchFamily="49" charset="0"/>
+              </a:rPr>
+              <a:t>header_checksum</a:t>
+            </a:r>
+            <a:endParaRPr lang="en-US" dirty="0">
+              <a:latin typeface="Source Code Pro" panose="020B0509030403020204" pitchFamily="49" charset="0"/>
+              <a:ea typeface="Source Code Pro" panose="020B0509030403020204" pitchFamily="49" charset="0"/>
+            </a:endParaRPr>
           </a:p>
           <a:p>
             <a:pPr marL="139700" indent="0">
@@ -8835,13 +9230,13 @@
         </p:nvSpPr>
         <p:spPr>
           <a:xfrm>
-            <a:off x="2367643" y="1152475"/>
-            <a:ext cx="5855909" cy="3416400"/>
+            <a:off x="1575707" y="1152475"/>
+            <a:ext cx="7256593" cy="3416400"/>
           </a:xfrm>
         </p:spPr>
         <p:txBody>
           <a:bodyPr>
-            <a:normAutofit/>
+            <a:normAutofit fontScale="92500" lnSpcReduction="10000"/>
           </a:bodyPr>
           <a:lstStyle/>
           <a:p>
@@ -8854,7 +9249,7 @@
                 <a:ea typeface="Source Code Pro" panose="020B0509030403020204" pitchFamily="49" charset="0"/>
                 <a:sym typeface="Wingdings" pitchFamily="2" charset="2"/>
               </a:rPr>
-              <a:t>                         2^8 = 256</a:t>
+              <a:t>                                        2^8 = 256</a:t>
             </a:r>
           </a:p>
           <a:p>
@@ -8867,7 +9262,7 @@
                 <a:ea typeface="Source Code Pro" panose="020B0509030403020204" pitchFamily="49" charset="0"/>
                 <a:sym typeface="Wingdings" pitchFamily="2" charset="2"/>
               </a:rPr>
-              <a:t>                     </a:t>
+              <a:t>                                    </a:t>
             </a:r>
             <a:r>
               <a:rPr lang="en-US" spc="300" dirty="0" err="1">
@@ -8971,7 +9366,7 @@
                 <a:latin typeface="Source Code Pro" panose="020B0509030403020204" pitchFamily="49" charset="0"/>
                 <a:ea typeface="Source Code Pro" panose="020B0509030403020204" pitchFamily="49" charset="0"/>
               </a:rPr>
-              <a:t>(q / r)  = 354 / 2^8         </a:t>
+              <a:t>(q / r)  = 354 / 2^8                      </a:t>
             </a:r>
             <a:r>
               <a:rPr lang="en-US" sz="1400" spc="300" dirty="0">
@@ -9006,7 +9401,7 @@
                 <a:latin typeface="Source Code Pro" panose="020B0509030403020204" pitchFamily="49" charset="0"/>
                 <a:ea typeface="Source Code Pro" panose="020B0509030403020204" pitchFamily="49" charset="0"/>
               </a:rPr>
-              <a:t> - (q + r) </a:t>
+              <a:t> - (q + r)              </a:t>
             </a:r>
             <a:r>
               <a:rPr lang="en-US" sz="1400" spc="300" dirty="0">
@@ -9016,6 +9411,44 @@
               </a:rPr>
               <a:t> 156</a:t>
             </a:r>
+            <a:br>
+              <a:rPr lang="en-US" sz="1400" spc="300" dirty="0">
+                <a:latin typeface="Source Code Pro" panose="020B0509030403020204" pitchFamily="49" charset="0"/>
+                <a:ea typeface="Source Code Pro" panose="020B0509030403020204" pitchFamily="49" charset="0"/>
+                <a:sym typeface="Wingdings" pitchFamily="2" charset="2"/>
+              </a:rPr>
+            </a:br>
+            <a:r>
+              <a:rPr lang="en-US" sz="1400" spc="300" dirty="0">
+                <a:latin typeface="Source Code Pro" panose="020B0509030403020204" pitchFamily="49" charset="0"/>
+                <a:ea typeface="Source Code Pro" panose="020B0509030403020204" pitchFamily="49" charset="0"/>
+                <a:sym typeface="Wingdings" pitchFamily="2" charset="2"/>
+              </a:rPr>
+              <a:t>(</a:t>
+            </a:r>
+            <a:r>
+              <a:rPr lang="en-US" sz="1400" spc="300" dirty="0" err="1">
+                <a:latin typeface="Source Code Pro" panose="020B0509030403020204" pitchFamily="49" charset="0"/>
+                <a:ea typeface="Source Code Pro" panose="020B0509030403020204" pitchFamily="49" charset="0"/>
+                <a:sym typeface="Wingdings" pitchFamily="2" charset="2"/>
+              </a:rPr>
+              <a:t>header_checksum</a:t>
+            </a:r>
+            <a:r>
+              <a:rPr lang="en-US" sz="1400" spc="300" dirty="0">
+                <a:latin typeface="Source Code Pro" panose="020B0509030403020204" pitchFamily="49" charset="0"/>
+                <a:ea typeface="Source Code Pro" panose="020B0509030403020204" pitchFamily="49" charset="0"/>
+                <a:sym typeface="Wingdings" pitchFamily="2" charset="2"/>
+              </a:rPr>
+              <a:t> == checksum )? 0 : error  0 </a:t>
+            </a:r>
+            <a:br>
+              <a:rPr lang="en-US" sz="1400" spc="300" dirty="0">
+                <a:latin typeface="Source Code Pro" panose="020B0509030403020204" pitchFamily="49" charset="0"/>
+                <a:ea typeface="Source Code Pro" panose="020B0509030403020204" pitchFamily="49" charset="0"/>
+                <a:sym typeface="Wingdings" pitchFamily="2" charset="2"/>
+              </a:rPr>
+            </a:br>
             <a:br>
               <a:rPr lang="en-US" sz="1400" spc="300" dirty="0">
                 <a:latin typeface="Source Code Pro" panose="020B0509030403020204" pitchFamily="49" charset="0"/>
@@ -9161,10 +9594,883 @@
           </a:fontRef>
         </p:style>
       </p:cxnSp>
+      <p:cxnSp>
+        <p:nvCxnSpPr>
+          <p:cNvPr id="9" name="Curved Connector 8">
+            <a:extLst>
+              <a:ext uri="{FF2B5EF4-FFF2-40B4-BE49-F238E27FC236}">
+                <a16:creationId xmlns:a16="http://schemas.microsoft.com/office/drawing/2014/main" id="{089FE3B7-756B-BA7A-6FDC-1A3E086ED992}"/>
+              </a:ext>
+            </a:extLst>
+          </p:cNvPr>
+          <p:cNvCxnSpPr>
+            <a:cxnSpLocks/>
+            <a:stCxn id="7" idx="4"/>
+            <a:endCxn id="5" idx="1"/>
+          </p:cNvCxnSpPr>
+          <p:nvPr/>
+        </p:nvCxnSpPr>
+        <p:spPr>
+          <a:xfrm rot="16200000" flipH="1">
+            <a:off x="4424059" y="121629"/>
+            <a:ext cx="798866" cy="6025679"/>
+          </a:xfrm>
+          <a:prstGeom prst="curvedConnector3">
+            <a:avLst>
+              <a:gd name="adj1" fmla="val 50000"/>
+            </a:avLst>
+          </a:prstGeom>
+          <a:ln>
+            <a:headEnd type="triangle"/>
+            <a:tailEnd type="triangle"/>
+          </a:ln>
+        </p:spPr>
+        <p:style>
+          <a:lnRef idx="1">
+            <a:schemeClr val="accent1"/>
+          </a:lnRef>
+          <a:fillRef idx="0">
+            <a:schemeClr val="accent1"/>
+          </a:fillRef>
+          <a:effectRef idx="0">
+            <a:schemeClr val="accent1"/>
+          </a:effectRef>
+          <a:fontRef idx="minor">
+            <a:schemeClr val="tx1"/>
+          </a:fontRef>
+        </p:style>
+      </p:cxnSp>
     </p:spTree>
     <p:extLst>
       <p:ext uri="{BB962C8B-B14F-4D97-AF65-F5344CB8AC3E}">
         <p14:creationId xmlns:p14="http://schemas.microsoft.com/office/powerpoint/2010/main" val="3476372458"/>
+      </p:ext>
+    </p:extLst>
+  </p:cSld>
+  <p:clrMapOvr>
+    <a:masterClrMapping/>
+  </p:clrMapOvr>
+</p:sld>
+</file>
+
+<file path=ppt/slides/slide6.xml><?xml version="1.0" encoding="utf-8"?>
+<p:sld xmlns:a="http://schemas.openxmlformats.org/drawingml/2006/main" xmlns:r="http://schemas.openxmlformats.org/officeDocument/2006/relationships" xmlns:p="http://schemas.openxmlformats.org/presentationml/2006/main">
+  <p:cSld>
+    <p:spTree>
+      <p:nvGrpSpPr>
+        <p:cNvPr id="1" name=""/>
+        <p:cNvGrpSpPr/>
+        <p:nvPr/>
+      </p:nvGrpSpPr>
+      <p:grpSpPr>
+        <a:xfrm>
+          <a:off x="0" y="0"/>
+          <a:ext cx="0" cy="0"/>
+          <a:chOff x="0" y="0"/>
+          <a:chExt cx="0" cy="0"/>
+        </a:xfrm>
+      </p:grpSpPr>
+      <p:sp>
+        <p:nvSpPr>
+          <p:cNvPr id="2" name="Title 1">
+            <a:extLst>
+              <a:ext uri="{FF2B5EF4-FFF2-40B4-BE49-F238E27FC236}">
+                <a16:creationId xmlns:a16="http://schemas.microsoft.com/office/drawing/2014/main" id="{CBBE89D6-E585-B44A-A070-CD1D554BC667}"/>
+              </a:ext>
+            </a:extLst>
+          </p:cNvPr>
+          <p:cNvSpPr>
+            <a:spLocks noGrp="1"/>
+          </p:cNvSpPr>
+          <p:nvPr>
+            <p:ph type="title"/>
+          </p:nvPr>
+        </p:nvSpPr>
+        <p:spPr/>
+        <p:txBody>
+          <a:bodyPr>
+            <a:normAutofit fontScale="90000"/>
+          </a:bodyPr>
+          <a:lstStyle/>
+          <a:p>
+            <a:r>
+              <a:rPr lang="en-US" dirty="0"/>
+              <a:t>Checksum: using 8-bits  </a:t>
+            </a:r>
+            <a:r>
+              <a:rPr lang="en-US" sz="2000" dirty="0"/>
+              <a:t>(from 229_error.txt)</a:t>
+            </a:r>
+            <a:endParaRPr lang="en-US" dirty="0"/>
+          </a:p>
+        </p:txBody>
+      </p:sp>
+      <p:sp>
+        <p:nvSpPr>
+          <p:cNvPr id="5" name="Oval 4">
+            <a:extLst>
+              <a:ext uri="{FF2B5EF4-FFF2-40B4-BE49-F238E27FC236}">
+                <a16:creationId xmlns:a16="http://schemas.microsoft.com/office/drawing/2014/main" id="{2C5DE20D-B456-AF59-DB84-B1978847B978}"/>
+              </a:ext>
+            </a:extLst>
+          </p:cNvPr>
+          <p:cNvSpPr/>
+          <p:nvPr/>
+        </p:nvSpPr>
+        <p:spPr>
+          <a:xfrm>
+            <a:off x="7747855" y="3480411"/>
+            <a:ext cx="710293" cy="326572"/>
+          </a:xfrm>
+          <a:prstGeom prst="ellipse">
+            <a:avLst/>
+          </a:prstGeom>
+          <a:solidFill>
+            <a:schemeClr val="accent1">
+              <a:lumMod val="20000"/>
+              <a:lumOff val="80000"/>
+            </a:schemeClr>
+          </a:solidFill>
+          <a:ln>
+            <a:solidFill>
+              <a:schemeClr val="accent1">
+                <a:lumMod val="20000"/>
+                <a:lumOff val="80000"/>
+              </a:schemeClr>
+            </a:solidFill>
+          </a:ln>
+        </p:spPr>
+        <p:style>
+          <a:lnRef idx="2">
+            <a:schemeClr val="accent1">
+              <a:shade val="50000"/>
+            </a:schemeClr>
+          </a:lnRef>
+          <a:fillRef idx="1">
+            <a:schemeClr val="accent1"/>
+          </a:fillRef>
+          <a:effectRef idx="0">
+            <a:schemeClr val="accent1"/>
+          </a:effectRef>
+          <a:fontRef idx="minor">
+            <a:schemeClr val="lt1"/>
+          </a:fontRef>
+        </p:style>
+        <p:txBody>
+          <a:bodyPr rtlCol="0" anchor="ctr"/>
+          <a:lstStyle/>
+          <a:p>
+            <a:pPr algn="ctr"/>
+            <a:endParaRPr lang="en-US">
+              <a:solidFill>
+                <a:schemeClr val="accent1">
+                  <a:lumMod val="20000"/>
+                  <a:lumOff val="80000"/>
+                </a:schemeClr>
+              </a:solidFill>
+            </a:endParaRPr>
+          </a:p>
+        </p:txBody>
+      </p:sp>
+      <p:sp>
+        <p:nvSpPr>
+          <p:cNvPr id="7" name="Oval 6">
+            <a:extLst>
+              <a:ext uri="{FF2B5EF4-FFF2-40B4-BE49-F238E27FC236}">
+                <a16:creationId xmlns:a16="http://schemas.microsoft.com/office/drawing/2014/main" id="{E42E8E41-13A5-64B0-02CD-550079611B27}"/>
+              </a:ext>
+            </a:extLst>
+          </p:cNvPr>
+          <p:cNvSpPr/>
+          <p:nvPr/>
+        </p:nvSpPr>
+        <p:spPr>
+          <a:xfrm>
+            <a:off x="1412422" y="2408464"/>
+            <a:ext cx="710293" cy="326572"/>
+          </a:xfrm>
+          <a:prstGeom prst="ellipse">
+            <a:avLst/>
+          </a:prstGeom>
+          <a:solidFill>
+            <a:schemeClr val="accent1">
+              <a:lumMod val="20000"/>
+              <a:lumOff val="80000"/>
+            </a:schemeClr>
+          </a:solidFill>
+          <a:ln>
+            <a:solidFill>
+              <a:schemeClr val="accent1">
+                <a:lumMod val="20000"/>
+                <a:lumOff val="80000"/>
+              </a:schemeClr>
+            </a:solidFill>
+          </a:ln>
+        </p:spPr>
+        <p:style>
+          <a:lnRef idx="2">
+            <a:schemeClr val="accent1">
+              <a:shade val="50000"/>
+            </a:schemeClr>
+          </a:lnRef>
+          <a:fillRef idx="1">
+            <a:schemeClr val="accent1"/>
+          </a:fillRef>
+          <a:effectRef idx="0">
+            <a:schemeClr val="accent1"/>
+          </a:effectRef>
+          <a:fontRef idx="minor">
+            <a:schemeClr val="lt1"/>
+          </a:fontRef>
+        </p:style>
+        <p:txBody>
+          <a:bodyPr rtlCol="0" anchor="ctr"/>
+          <a:lstStyle/>
+          <a:p>
+            <a:pPr algn="ctr"/>
+            <a:endParaRPr lang="en-US" dirty="0"/>
+          </a:p>
+        </p:txBody>
+      </p:sp>
+      <p:sp>
+        <p:nvSpPr>
+          <p:cNvPr id="3" name="Text Placeholder 2">
+            <a:extLst>
+              <a:ext uri="{FF2B5EF4-FFF2-40B4-BE49-F238E27FC236}">
+                <a16:creationId xmlns:a16="http://schemas.microsoft.com/office/drawing/2014/main" id="{A6CB12AF-D8EC-DB4D-AFEE-A8ED0D1696DA}"/>
+              </a:ext>
+            </a:extLst>
+          </p:cNvPr>
+          <p:cNvSpPr>
+            <a:spLocks noGrp="1"/>
+          </p:cNvSpPr>
+          <p:nvPr>
+            <p:ph type="body" idx="1"/>
+          </p:nvPr>
+        </p:nvSpPr>
+        <p:spPr/>
+        <p:txBody>
+          <a:bodyPr>
+            <a:normAutofit/>
+          </a:bodyPr>
+          <a:lstStyle/>
+          <a:p>
+            <a:pPr marL="139700" indent="0">
+              <a:buNone/>
+            </a:pPr>
+            <a:r>
+              <a:rPr lang="en-US" dirty="0">
+                <a:latin typeface="Source Code Pro" panose="020B0509030403020204" pitchFamily="49" charset="0"/>
+                <a:ea typeface="Source Code Pro" panose="020B0509030403020204" pitchFamily="49" charset="0"/>
+              </a:rPr>
+              <a:t>   45 </a:t>
+            </a:r>
+          </a:p>
+          <a:p>
+            <a:pPr marL="139700" indent="0">
+              <a:buNone/>
+            </a:pPr>
+            <a:r>
+              <a:rPr lang="en-US" dirty="0">
+                <a:latin typeface="Source Code Pro" panose="020B0509030403020204" pitchFamily="49" charset="0"/>
+                <a:ea typeface="Source Code Pro" panose="020B0509030403020204" pitchFamily="49" charset="0"/>
+              </a:rPr>
+              <a:t>    2</a:t>
+            </a:r>
+          </a:p>
+          <a:p>
+            <a:pPr marL="139700" indent="0">
+              <a:buNone/>
+            </a:pPr>
+            <a:r>
+              <a:rPr lang="en-US" dirty="0">
+                <a:latin typeface="Source Code Pro" panose="020B0509030403020204" pitchFamily="49" charset="0"/>
+                <a:ea typeface="Source Code Pro" panose="020B0509030403020204" pitchFamily="49" charset="0"/>
+              </a:rPr>
+              <a:t>   16</a:t>
+            </a:r>
+          </a:p>
+          <a:p>
+            <a:pPr marL="139700" indent="0">
+              <a:buNone/>
+            </a:pPr>
+            <a:r>
+              <a:rPr lang="en-US" dirty="0">
+                <a:latin typeface="Source Code Pro" panose="020B0509030403020204" pitchFamily="49" charset="0"/>
+                <a:ea typeface="Source Code Pro" panose="020B0509030403020204" pitchFamily="49" charset="0"/>
+              </a:rPr>
+              <a:t>    5</a:t>
+            </a:r>
+          </a:p>
+          <a:p>
+            <a:pPr marL="139700" indent="0">
+              <a:buNone/>
+            </a:pPr>
+            <a:r>
+              <a:rPr lang="en-US" dirty="0">
+                <a:latin typeface="Source Code Pro" panose="020B0509030403020204" pitchFamily="49" charset="0"/>
+                <a:ea typeface="Source Code Pro" panose="020B0509030403020204" pitchFamily="49" charset="0"/>
+              </a:rPr>
+              <a:t>   12</a:t>
+            </a:r>
+          </a:p>
+          <a:p>
+            <a:pPr marL="139700" indent="0">
+              <a:buNone/>
+            </a:pPr>
+            <a:r>
+              <a:rPr lang="en-US" dirty="0">
+                <a:latin typeface="Source Code Pro" panose="020B0509030403020204" pitchFamily="49" charset="0"/>
+                <a:ea typeface="Source Code Pro" panose="020B0509030403020204" pitchFamily="49" charset="0"/>
+              </a:rPr>
+              <a:t>    0  </a:t>
+            </a:r>
+            <a:r>
+              <a:rPr lang="en-US" dirty="0">
+                <a:latin typeface="Source Code Pro" panose="020B0509030403020204" pitchFamily="49" charset="0"/>
+                <a:ea typeface="Source Code Pro" panose="020B0509030403020204" pitchFamily="49" charset="0"/>
+                <a:sym typeface="Wingdings" pitchFamily="2" charset="2"/>
+              </a:rPr>
+              <a:t> </a:t>
+            </a:r>
+            <a:r>
+              <a:rPr lang="en-US" dirty="0">
+                <a:latin typeface="Source Code Pro" panose="020B0509030403020204" pitchFamily="49" charset="0"/>
+                <a:ea typeface="Source Code Pro" panose="020B0509030403020204" pitchFamily="49" charset="0"/>
+              </a:rPr>
+              <a:t>229: </a:t>
+            </a:r>
+            <a:r>
+              <a:rPr lang="en-US" dirty="0" err="1">
+                <a:latin typeface="Source Code Pro" panose="020B0509030403020204" pitchFamily="49" charset="0"/>
+                <a:ea typeface="Source Code Pro" panose="020B0509030403020204" pitchFamily="49" charset="0"/>
+              </a:rPr>
+              <a:t>header_checksum</a:t>
+            </a:r>
+            <a:endParaRPr lang="en-US" dirty="0">
+              <a:latin typeface="Source Code Pro" panose="020B0509030403020204" pitchFamily="49" charset="0"/>
+              <a:ea typeface="Source Code Pro" panose="020B0509030403020204" pitchFamily="49" charset="0"/>
+            </a:endParaRPr>
+          </a:p>
+          <a:p>
+            <a:pPr marL="139700" indent="0">
+              <a:buNone/>
+            </a:pPr>
+            <a:r>
+              <a:rPr lang="en-US" dirty="0">
+                <a:latin typeface="Source Code Pro" panose="020B0509030403020204" pitchFamily="49" charset="0"/>
+                <a:ea typeface="Source Code Pro" panose="020B0509030403020204" pitchFamily="49" charset="0"/>
+              </a:rPr>
+              <a:t>   55</a:t>
+            </a:r>
+          </a:p>
+          <a:p>
+            <a:pPr marL="139700" indent="0">
+              <a:buNone/>
+            </a:pPr>
+            <a:r>
+              <a:rPr lang="en-US" dirty="0">
+                <a:latin typeface="Source Code Pro" panose="020B0509030403020204" pitchFamily="49" charset="0"/>
+                <a:ea typeface="Source Code Pro" panose="020B0509030403020204" pitchFamily="49" charset="0"/>
+              </a:rPr>
+              <a:t>   17</a:t>
+            </a:r>
+          </a:p>
+          <a:p>
+            <a:pPr marL="139700" indent="0">
+              <a:buNone/>
+            </a:pPr>
+            <a:r>
+              <a:rPr lang="en-US" dirty="0">
+                <a:latin typeface="Source Code Pro" panose="020B0509030403020204" pitchFamily="49" charset="0"/>
+                <a:ea typeface="Source Code Pro" panose="020B0509030403020204" pitchFamily="49" charset="0"/>
+              </a:rPr>
+              <a:t>  192</a:t>
+            </a:r>
+          </a:p>
+          <a:p>
+            <a:pPr marL="139700" indent="0">
+              <a:buNone/>
+            </a:pPr>
+            <a:r>
+              <a:rPr lang="en-US" dirty="0">
+                <a:latin typeface="Source Code Pro" panose="020B0509030403020204" pitchFamily="49" charset="0"/>
+                <a:ea typeface="Source Code Pro" panose="020B0509030403020204" pitchFamily="49" charset="0"/>
+              </a:rPr>
+              <a:t>   34</a:t>
+            </a:r>
+          </a:p>
+          <a:p>
+            <a:pPr marL="139700" indent="0">
+              <a:buNone/>
+            </a:pPr>
+            <a:r>
+              <a:rPr lang="en-US" dirty="0">
+                <a:latin typeface="Source Code Pro" panose="020B0509030403020204" pitchFamily="49" charset="0"/>
+                <a:ea typeface="Source Code Pro" panose="020B0509030403020204" pitchFamily="49" charset="0"/>
+              </a:rPr>
+              <a:t>+ 378 </a:t>
+            </a:r>
+            <a:endParaRPr lang="en-US" dirty="0">
+              <a:solidFill>
+                <a:srgbClr val="000000"/>
+              </a:solidFill>
+              <a:effectLst/>
+              <a:latin typeface="Menlo" panose="020B0609030804020204" pitchFamily="49" charset="0"/>
+            </a:endParaRPr>
+          </a:p>
+          <a:p>
+            <a:pPr marL="139700" indent="0">
+              <a:buNone/>
+            </a:pPr>
+            <a:endParaRPr lang="en-US" dirty="0">
+              <a:solidFill>
+                <a:srgbClr val="000000"/>
+              </a:solidFill>
+              <a:effectLst/>
+              <a:latin typeface="PT Mono" panose="02060509020205020204" pitchFamily="49" charset="77"/>
+            </a:endParaRPr>
+          </a:p>
+          <a:p>
+            <a:endParaRPr lang="en-US" dirty="0">
+              <a:latin typeface="Source Code Pro" panose="020B0509030403020204" pitchFamily="49" charset="0"/>
+              <a:ea typeface="Source Code Pro" panose="020B0509030403020204" pitchFamily="49" charset="0"/>
+            </a:endParaRPr>
+          </a:p>
+        </p:txBody>
+      </p:sp>
+      <p:sp>
+        <p:nvSpPr>
+          <p:cNvPr id="4" name="Text Placeholder 3">
+            <a:extLst>
+              <a:ext uri="{FF2B5EF4-FFF2-40B4-BE49-F238E27FC236}">
+                <a16:creationId xmlns:a16="http://schemas.microsoft.com/office/drawing/2014/main" id="{4829E234-FD16-E24B-9FC6-B0BB96215F38}"/>
+              </a:ext>
+            </a:extLst>
+          </p:cNvPr>
+          <p:cNvSpPr>
+            <a:spLocks noGrp="1"/>
+          </p:cNvSpPr>
+          <p:nvPr>
+            <p:ph type="body" idx="2"/>
+          </p:nvPr>
+        </p:nvSpPr>
+        <p:spPr>
+          <a:xfrm>
+            <a:off x="1575707" y="1152475"/>
+            <a:ext cx="7453993" cy="3416400"/>
+          </a:xfrm>
+        </p:spPr>
+        <p:txBody>
+          <a:bodyPr>
+            <a:normAutofit fontScale="92500" lnSpcReduction="10000"/>
+          </a:bodyPr>
+          <a:lstStyle/>
+          <a:p>
+            <a:pPr marL="139700" indent="0">
+              <a:buNone/>
+            </a:pPr>
+            <a:r>
+              <a:rPr lang="en-US" sz="1400" spc="300" dirty="0">
+                <a:latin typeface="Source Code Pro" panose="020B0509030403020204" pitchFamily="49" charset="0"/>
+                <a:ea typeface="Source Code Pro" panose="020B0509030403020204" pitchFamily="49" charset="0"/>
+                <a:sym typeface="Wingdings" pitchFamily="2" charset="2"/>
+              </a:rPr>
+              <a:t>                                        2^8 = 256</a:t>
+            </a:r>
+          </a:p>
+          <a:p>
+            <a:pPr marL="139700" indent="0">
+              <a:buNone/>
+            </a:pPr>
+            <a:r>
+              <a:rPr lang="en-US" spc="300" dirty="0">
+                <a:latin typeface="Source Code Pro" panose="020B0509030403020204" pitchFamily="49" charset="0"/>
+                <a:ea typeface="Source Code Pro" panose="020B0509030403020204" pitchFamily="49" charset="0"/>
+                <a:sym typeface="Wingdings" pitchFamily="2" charset="2"/>
+              </a:rPr>
+              <a:t>                                    </a:t>
+            </a:r>
+            <a:r>
+              <a:rPr lang="en-US" spc="300" dirty="0" err="1">
+                <a:latin typeface="Source Code Pro" panose="020B0509030403020204" pitchFamily="49" charset="0"/>
+                <a:ea typeface="Source Code Pro" panose="020B0509030403020204" pitchFamily="49" charset="0"/>
+                <a:sym typeface="Wingdings" pitchFamily="2" charset="2"/>
+              </a:rPr>
+              <a:t>max_int</a:t>
+            </a:r>
+            <a:r>
+              <a:rPr lang="en-US" spc="300" dirty="0">
+                <a:latin typeface="Source Code Pro" panose="020B0509030403020204" pitchFamily="49" charset="0"/>
+                <a:ea typeface="Source Code Pro" panose="020B0509030403020204" pitchFamily="49" charset="0"/>
+                <a:sym typeface="Wingdings" pitchFamily="2" charset="2"/>
+              </a:rPr>
+              <a:t> = 255</a:t>
+            </a:r>
+            <a:endParaRPr lang="en-US" sz="1400" spc="300" dirty="0">
+              <a:latin typeface="Source Code Pro" panose="020B0509030403020204" pitchFamily="49" charset="0"/>
+              <a:ea typeface="Source Code Pro" panose="020B0509030403020204" pitchFamily="49" charset="0"/>
+            </a:endParaRPr>
+          </a:p>
+          <a:p>
+            <a:pPr marL="139700" indent="0">
+              <a:buNone/>
+            </a:pPr>
+            <a:endParaRPr lang="en-US" sz="1400" spc="300" dirty="0">
+              <a:latin typeface="Source Code Pro" panose="020B0509030403020204" pitchFamily="49" charset="0"/>
+              <a:ea typeface="Source Code Pro" panose="020B0509030403020204" pitchFamily="49" charset="0"/>
+            </a:endParaRPr>
+          </a:p>
+          <a:p>
+            <a:pPr marL="139700" indent="0">
+              <a:buNone/>
+            </a:pPr>
+            <a:endParaRPr lang="en-US" sz="1400" spc="300" dirty="0">
+              <a:latin typeface="Source Code Pro" panose="020B0509030403020204" pitchFamily="49" charset="0"/>
+              <a:ea typeface="Source Code Pro" panose="020B0509030403020204" pitchFamily="49" charset="0"/>
+            </a:endParaRPr>
+          </a:p>
+          <a:p>
+            <a:pPr marL="139700" indent="0">
+              <a:buNone/>
+            </a:pPr>
+            <a:endParaRPr lang="en-US" sz="1400" spc="300" dirty="0">
+              <a:latin typeface="Source Code Pro" panose="020B0509030403020204" pitchFamily="49" charset="0"/>
+              <a:ea typeface="Source Code Pro" panose="020B0509030403020204" pitchFamily="49" charset="0"/>
+            </a:endParaRPr>
+          </a:p>
+          <a:p>
+            <a:pPr marL="139700" indent="0">
+              <a:buNone/>
+            </a:pPr>
+            <a:endParaRPr lang="en-US" spc="300" dirty="0">
+              <a:latin typeface="Source Code Pro" panose="020B0509030403020204" pitchFamily="49" charset="0"/>
+              <a:ea typeface="Source Code Pro" panose="020B0509030403020204" pitchFamily="49" charset="0"/>
+            </a:endParaRPr>
+          </a:p>
+          <a:p>
+            <a:pPr marL="139700" indent="0">
+              <a:buNone/>
+            </a:pPr>
+            <a:endParaRPr lang="en-US" sz="1400" spc="300" dirty="0">
+              <a:latin typeface="Source Code Pro" panose="020B0509030403020204" pitchFamily="49" charset="0"/>
+              <a:ea typeface="Source Code Pro" panose="020B0509030403020204" pitchFamily="49" charset="0"/>
+            </a:endParaRPr>
+          </a:p>
+          <a:p>
+            <a:pPr marL="139700" indent="0">
+              <a:buNone/>
+            </a:pPr>
+            <a:endParaRPr lang="en-US" spc="300" dirty="0">
+              <a:latin typeface="Source Code Pro" panose="020B0509030403020204" pitchFamily="49" charset="0"/>
+              <a:ea typeface="Source Code Pro" panose="020B0509030403020204" pitchFamily="49" charset="0"/>
+            </a:endParaRPr>
+          </a:p>
+          <a:p>
+            <a:pPr marL="139700" indent="0">
+              <a:buNone/>
+            </a:pPr>
+            <a:endParaRPr lang="en-US" sz="1400" spc="300" dirty="0">
+              <a:latin typeface="Source Code Pro" panose="020B0509030403020204" pitchFamily="49" charset="0"/>
+              <a:ea typeface="Source Code Pro" panose="020B0509030403020204" pitchFamily="49" charset="0"/>
+            </a:endParaRPr>
+          </a:p>
+          <a:p>
+            <a:pPr marL="139700" indent="0">
+              <a:buNone/>
+            </a:pPr>
+            <a:endParaRPr lang="en-US" spc="300" dirty="0">
+              <a:latin typeface="Source Code Pro" panose="020B0509030403020204" pitchFamily="49" charset="0"/>
+              <a:ea typeface="Source Code Pro" panose="020B0509030403020204" pitchFamily="49" charset="0"/>
+            </a:endParaRPr>
+          </a:p>
+          <a:p>
+            <a:pPr marL="139700" indent="0">
+              <a:buNone/>
+            </a:pPr>
+            <a:r>
+              <a:rPr lang="en-US" sz="1400" spc="300" dirty="0">
+                <a:latin typeface="Source Code Pro" panose="020B0509030403020204" pitchFamily="49" charset="0"/>
+                <a:ea typeface="Source Code Pro" panose="020B0509030403020204" pitchFamily="49" charset="0"/>
+              </a:rPr>
+              <a:t>(q / r)  = 378 / 2^8                      </a:t>
+            </a:r>
+            <a:r>
+              <a:rPr lang="en-US" sz="1400" spc="300" dirty="0">
+                <a:latin typeface="Source Code Pro" panose="020B0509030403020204" pitchFamily="49" charset="0"/>
+                <a:ea typeface="Source Code Pro" panose="020B0509030403020204" pitchFamily="49" charset="0"/>
+                <a:sym typeface="Wingdings" pitchFamily="2" charset="2"/>
+              </a:rPr>
+              <a:t> (1 122)</a:t>
+            </a:r>
+            <a:br>
+              <a:rPr lang="en-US" sz="1400" spc="300" dirty="0">
+                <a:latin typeface="Source Code Pro" panose="020B0509030403020204" pitchFamily="49" charset="0"/>
+                <a:ea typeface="Source Code Pro" panose="020B0509030403020204" pitchFamily="49" charset="0"/>
+              </a:rPr>
+            </a:br>
+            <a:r>
+              <a:rPr lang="en-US" sz="1400" spc="300" dirty="0">
+                <a:latin typeface="Source Code Pro" panose="020B0509030403020204" pitchFamily="49" charset="0"/>
+                <a:ea typeface="Source Code Pro" panose="020B0509030403020204" pitchFamily="49" charset="0"/>
+              </a:rPr>
+              <a:t>checksum = </a:t>
+            </a:r>
+            <a:r>
+              <a:rPr lang="en-US" sz="1400" spc="300" dirty="0" err="1">
+                <a:latin typeface="Source Code Pro" panose="020B0509030403020204" pitchFamily="49" charset="0"/>
+                <a:ea typeface="Source Code Pro" panose="020B0509030403020204" pitchFamily="49" charset="0"/>
+              </a:rPr>
+              <a:t>max_int</a:t>
+            </a:r>
+            <a:r>
+              <a:rPr lang="en-US" sz="1400" spc="300" dirty="0">
+                <a:latin typeface="Source Code Pro" panose="020B0509030403020204" pitchFamily="49" charset="0"/>
+                <a:ea typeface="Source Code Pro" panose="020B0509030403020204" pitchFamily="49" charset="0"/>
+              </a:rPr>
+              <a:t> - (q + r)              </a:t>
+            </a:r>
+            <a:r>
+              <a:rPr lang="en-US" sz="1400" spc="300" dirty="0">
+                <a:latin typeface="Source Code Pro" panose="020B0509030403020204" pitchFamily="49" charset="0"/>
+                <a:ea typeface="Source Code Pro" panose="020B0509030403020204" pitchFamily="49" charset="0"/>
+                <a:sym typeface="Wingdings" pitchFamily="2" charset="2"/>
+              </a:rPr>
+              <a:t> 132</a:t>
+            </a:r>
+            <a:br>
+              <a:rPr lang="en-US" sz="1400" spc="300" dirty="0">
+                <a:latin typeface="Source Code Pro" panose="020B0509030403020204" pitchFamily="49" charset="0"/>
+                <a:ea typeface="Source Code Pro" panose="020B0509030403020204" pitchFamily="49" charset="0"/>
+                <a:sym typeface="Wingdings" pitchFamily="2" charset="2"/>
+              </a:rPr>
+            </a:br>
+            <a:r>
+              <a:rPr lang="en-US" sz="1400" spc="300" dirty="0">
+                <a:latin typeface="Source Code Pro" panose="020B0509030403020204" pitchFamily="49" charset="0"/>
+                <a:ea typeface="Source Code Pro" panose="020B0509030403020204" pitchFamily="49" charset="0"/>
+                <a:sym typeface="Wingdings" pitchFamily="2" charset="2"/>
+              </a:rPr>
+              <a:t>(</a:t>
+            </a:r>
+            <a:r>
+              <a:rPr lang="en-US" sz="1400" spc="300" dirty="0" err="1">
+                <a:latin typeface="Source Code Pro" panose="020B0509030403020204" pitchFamily="49" charset="0"/>
+                <a:ea typeface="Source Code Pro" panose="020B0509030403020204" pitchFamily="49" charset="0"/>
+                <a:sym typeface="Wingdings" pitchFamily="2" charset="2"/>
+              </a:rPr>
+              <a:t>header_checksum</a:t>
+            </a:r>
+            <a:r>
+              <a:rPr lang="en-US" sz="1400" spc="300" dirty="0">
+                <a:latin typeface="Source Code Pro" panose="020B0509030403020204" pitchFamily="49" charset="0"/>
+                <a:ea typeface="Source Code Pro" panose="020B0509030403020204" pitchFamily="49" charset="0"/>
+                <a:sym typeface="Wingdings" pitchFamily="2" charset="2"/>
+              </a:rPr>
+              <a:t> == checksum )? 0 : error  error </a:t>
+            </a:r>
+            <a:br>
+              <a:rPr lang="en-US" sz="1400" spc="300" dirty="0">
+                <a:latin typeface="Source Code Pro" panose="020B0509030403020204" pitchFamily="49" charset="0"/>
+                <a:ea typeface="Source Code Pro" panose="020B0509030403020204" pitchFamily="49" charset="0"/>
+                <a:sym typeface="Wingdings" pitchFamily="2" charset="2"/>
+              </a:rPr>
+            </a:br>
+            <a:br>
+              <a:rPr lang="en-US" sz="1400" spc="300" dirty="0">
+                <a:latin typeface="Source Code Pro" panose="020B0509030403020204" pitchFamily="49" charset="0"/>
+                <a:ea typeface="Source Code Pro" panose="020B0509030403020204" pitchFamily="49" charset="0"/>
+                <a:sym typeface="Wingdings" pitchFamily="2" charset="2"/>
+              </a:rPr>
+            </a:br>
+            <a:endParaRPr lang="en-US" sz="1400" spc="300" dirty="0">
+              <a:latin typeface="Source Code Pro" panose="020B0509030403020204" pitchFamily="49" charset="0"/>
+              <a:ea typeface="Source Code Pro" panose="020B0509030403020204" pitchFamily="49" charset="0"/>
+              <a:sym typeface="Wingdings" pitchFamily="2" charset="2"/>
+            </a:endParaRPr>
+          </a:p>
+          <a:p>
+            <a:pPr marL="139700" indent="0">
+              <a:buNone/>
+            </a:pPr>
+            <a:endParaRPr lang="en-US" sz="1400" spc="300" dirty="0">
+              <a:latin typeface="Source Code Pro" panose="020B0509030403020204" pitchFamily="49" charset="0"/>
+              <a:ea typeface="Source Code Pro" panose="020B0509030403020204" pitchFamily="49" charset="0"/>
+              <a:sym typeface="Wingdings" pitchFamily="2" charset="2"/>
+            </a:endParaRPr>
+          </a:p>
+          <a:p>
+            <a:pPr marL="139700" indent="0">
+              <a:buNone/>
+            </a:pPr>
+            <a:endParaRPr lang="en-US" sz="1400" spc="300" dirty="0">
+              <a:latin typeface="Source Code Pro" panose="020B0509030403020204" pitchFamily="49" charset="0"/>
+              <a:ea typeface="Source Code Pro" panose="020B0509030403020204" pitchFamily="49" charset="0"/>
+              <a:sym typeface="Wingdings" pitchFamily="2" charset="2"/>
+            </a:endParaRPr>
+          </a:p>
+          <a:p>
+            <a:pPr marL="139700" indent="0">
+              <a:buNone/>
+            </a:pPr>
+            <a:endParaRPr lang="en-US" spc="300" dirty="0">
+              <a:latin typeface="Source Code Pro" panose="020B0509030403020204" pitchFamily="49" charset="0"/>
+              <a:ea typeface="Source Code Pro" panose="020B0509030403020204" pitchFamily="49" charset="0"/>
+              <a:sym typeface="Wingdings" pitchFamily="2" charset="2"/>
+            </a:endParaRPr>
+          </a:p>
+          <a:p>
+            <a:pPr marL="139700" indent="0">
+              <a:buNone/>
+            </a:pPr>
+            <a:endParaRPr lang="en-US" sz="1400" spc="300" dirty="0">
+              <a:latin typeface="Source Code Pro" panose="020B0509030403020204" pitchFamily="49" charset="0"/>
+              <a:ea typeface="Source Code Pro" panose="020B0509030403020204" pitchFamily="49" charset="0"/>
+              <a:sym typeface="Wingdings" pitchFamily="2" charset="2"/>
+            </a:endParaRPr>
+          </a:p>
+          <a:p>
+            <a:pPr marL="139700" indent="0">
+              <a:buNone/>
+            </a:pPr>
+            <a:endParaRPr lang="en-US" spc="300" dirty="0">
+              <a:latin typeface="Source Code Pro" panose="020B0509030403020204" pitchFamily="49" charset="0"/>
+              <a:ea typeface="Source Code Pro" panose="020B0509030403020204" pitchFamily="49" charset="0"/>
+              <a:sym typeface="Wingdings" pitchFamily="2" charset="2"/>
+            </a:endParaRPr>
+          </a:p>
+          <a:p>
+            <a:pPr marL="139700" indent="0">
+              <a:buNone/>
+            </a:pPr>
+            <a:endParaRPr lang="en-US" sz="1400" spc="300" dirty="0">
+              <a:latin typeface="Source Code Pro" panose="020B0509030403020204" pitchFamily="49" charset="0"/>
+              <a:ea typeface="Source Code Pro" panose="020B0509030403020204" pitchFamily="49" charset="0"/>
+              <a:sym typeface="Wingdings" pitchFamily="2" charset="2"/>
+            </a:endParaRPr>
+          </a:p>
+          <a:p>
+            <a:pPr marL="139700" indent="0">
+              <a:buNone/>
+            </a:pPr>
+            <a:endParaRPr lang="en-US" spc="300" dirty="0">
+              <a:latin typeface="Source Code Pro" panose="020B0509030403020204" pitchFamily="49" charset="0"/>
+              <a:ea typeface="Source Code Pro" panose="020B0509030403020204" pitchFamily="49" charset="0"/>
+              <a:sym typeface="Wingdings" pitchFamily="2" charset="2"/>
+            </a:endParaRPr>
+          </a:p>
+          <a:p>
+            <a:pPr marL="139700" indent="0">
+              <a:buNone/>
+            </a:pPr>
+            <a:endParaRPr lang="en-US" sz="1400" spc="300" dirty="0">
+              <a:latin typeface="Source Code Pro" panose="020B0509030403020204" pitchFamily="49" charset="0"/>
+              <a:ea typeface="Source Code Pro" panose="020B0509030403020204" pitchFamily="49" charset="0"/>
+              <a:sym typeface="Wingdings" pitchFamily="2" charset="2"/>
+            </a:endParaRPr>
+          </a:p>
+          <a:p>
+            <a:pPr marL="139700" indent="0">
+              <a:buNone/>
+            </a:pPr>
+            <a:endParaRPr lang="en-US" spc="300" dirty="0">
+              <a:latin typeface="Source Code Pro" panose="020B0509030403020204" pitchFamily="49" charset="0"/>
+              <a:ea typeface="Source Code Pro" panose="020B0509030403020204" pitchFamily="49" charset="0"/>
+              <a:sym typeface="Wingdings" pitchFamily="2" charset="2"/>
+            </a:endParaRPr>
+          </a:p>
+          <a:p>
+            <a:endParaRPr lang="en-US" dirty="0"/>
+          </a:p>
+        </p:txBody>
+      </p:sp>
+      <p:cxnSp>
+        <p:nvCxnSpPr>
+          <p:cNvPr id="6" name="Straight Connector 5">
+            <a:extLst>
+              <a:ext uri="{FF2B5EF4-FFF2-40B4-BE49-F238E27FC236}">
+                <a16:creationId xmlns:a16="http://schemas.microsoft.com/office/drawing/2014/main" id="{76B6B245-5FF7-7C49-9090-75EF2F2A59B2}"/>
+              </a:ext>
+            </a:extLst>
+          </p:cNvPr>
+          <p:cNvCxnSpPr/>
+          <p:nvPr/>
+        </p:nvCxnSpPr>
+        <p:spPr>
+          <a:xfrm flipH="1">
+            <a:off x="431797" y="3691467"/>
+            <a:ext cx="719667" cy="0"/>
+          </a:xfrm>
+          <a:prstGeom prst="line">
+            <a:avLst/>
+          </a:prstGeom>
+          <a:ln w="15875"/>
+        </p:spPr>
+        <p:style>
+          <a:lnRef idx="1">
+            <a:schemeClr val="dk1"/>
+          </a:lnRef>
+          <a:fillRef idx="0">
+            <a:schemeClr val="dk1"/>
+          </a:fillRef>
+          <a:effectRef idx="0">
+            <a:schemeClr val="dk1"/>
+          </a:effectRef>
+          <a:fontRef idx="minor">
+            <a:schemeClr val="tx1"/>
+          </a:fontRef>
+        </p:style>
+      </p:cxnSp>
+      <p:cxnSp>
+        <p:nvCxnSpPr>
+          <p:cNvPr id="9" name="Curved Connector 8">
+            <a:extLst>
+              <a:ext uri="{FF2B5EF4-FFF2-40B4-BE49-F238E27FC236}">
+                <a16:creationId xmlns:a16="http://schemas.microsoft.com/office/drawing/2014/main" id="{3CBBB29E-A3B4-2D80-AB91-3F884D54E510}"/>
+              </a:ext>
+            </a:extLst>
+          </p:cNvPr>
+          <p:cNvCxnSpPr>
+            <a:cxnSpLocks/>
+            <a:stCxn id="7" idx="4"/>
+            <a:endCxn id="5" idx="1"/>
+          </p:cNvCxnSpPr>
+          <p:nvPr/>
+        </p:nvCxnSpPr>
+        <p:spPr>
+          <a:xfrm rot="16200000" flipH="1">
+            <a:off x="4413122" y="89483"/>
+            <a:ext cx="793200" cy="6084306"/>
+          </a:xfrm>
+          <a:prstGeom prst="curvedConnector3">
+            <a:avLst>
+              <a:gd name="adj1" fmla="val 50000"/>
+            </a:avLst>
+          </a:prstGeom>
+          <a:ln>
+            <a:headEnd type="triangle"/>
+            <a:tailEnd type="triangle"/>
+          </a:ln>
+        </p:spPr>
+        <p:style>
+          <a:lnRef idx="1">
+            <a:schemeClr val="accent1"/>
+          </a:lnRef>
+          <a:fillRef idx="0">
+            <a:schemeClr val="accent1"/>
+          </a:fillRef>
+          <a:effectRef idx="0">
+            <a:schemeClr val="accent1"/>
+          </a:effectRef>
+          <a:fontRef idx="minor">
+            <a:schemeClr val="tx1"/>
+          </a:fontRef>
+        </p:style>
+      </p:cxnSp>
+    </p:spTree>
+    <p:extLst>
+      <p:ext uri="{BB962C8B-B14F-4D97-AF65-F5344CB8AC3E}">
+        <p14:creationId xmlns:p14="http://schemas.microsoft.com/office/powerpoint/2010/main" val="2279653940"/>
       </p:ext>
     </p:extLst>
   </p:cSld>

</xml_diff>